<commit_message>
Added additional slides and example code on file i/o
</commit_message>
<xml_diff>
--- a/Session 7 - Python/Instructional Material/Python Review and Tutorial.pptx
+++ b/Session 7 - Python/Instructional Material/Python Review and Tutorial.pptx
@@ -6,7 +6,7 @@
     <p:sldMasterId id="2147483660" r:id="rId2"/>
   </p:sldMasterIdLst>
   <p:notesMasterIdLst>
-    <p:notesMasterId r:id="rId128"/>
+    <p:notesMasterId r:id="rId132"/>
   </p:notesMasterIdLst>
   <p:sldIdLst>
     <p:sldId id="256" r:id="rId3"/>
@@ -112,28 +112,32 @@
     <p:sldId id="463" r:id="rId103"/>
     <p:sldId id="444" r:id="rId104"/>
     <p:sldId id="445" r:id="rId105"/>
-    <p:sldId id="452" r:id="rId106"/>
-    <p:sldId id="451" r:id="rId107"/>
+    <p:sldId id="497" r:id="rId106"/>
+    <p:sldId id="452" r:id="rId107"/>
     <p:sldId id="446" r:id="rId108"/>
     <p:sldId id="487" r:id="rId109"/>
     <p:sldId id="486" r:id="rId110"/>
-    <p:sldId id="457" r:id="rId111"/>
-    <p:sldId id="468" r:id="rId112"/>
-    <p:sldId id="469" r:id="rId113"/>
-    <p:sldId id="467" r:id="rId114"/>
-    <p:sldId id="489" r:id="rId115"/>
-    <p:sldId id="490" r:id="rId116"/>
-    <p:sldId id="491" r:id="rId117"/>
-    <p:sldId id="492" r:id="rId118"/>
-    <p:sldId id="493" r:id="rId119"/>
-    <p:sldId id="494" r:id="rId120"/>
-    <p:sldId id="495" r:id="rId121"/>
-    <p:sldId id="386" r:id="rId122"/>
-    <p:sldId id="456" r:id="rId123"/>
-    <p:sldId id="455" r:id="rId124"/>
-    <p:sldId id="454" r:id="rId125"/>
-    <p:sldId id="453" r:id="rId126"/>
-    <p:sldId id="375" r:id="rId127"/>
+    <p:sldId id="451" r:id="rId111"/>
+    <p:sldId id="496" r:id="rId112"/>
+    <p:sldId id="499" r:id="rId113"/>
+    <p:sldId id="498" r:id="rId114"/>
+    <p:sldId id="457" r:id="rId115"/>
+    <p:sldId id="468" r:id="rId116"/>
+    <p:sldId id="469" r:id="rId117"/>
+    <p:sldId id="467" r:id="rId118"/>
+    <p:sldId id="489" r:id="rId119"/>
+    <p:sldId id="490" r:id="rId120"/>
+    <p:sldId id="491" r:id="rId121"/>
+    <p:sldId id="492" r:id="rId122"/>
+    <p:sldId id="493" r:id="rId123"/>
+    <p:sldId id="494" r:id="rId124"/>
+    <p:sldId id="495" r:id="rId125"/>
+    <p:sldId id="386" r:id="rId126"/>
+    <p:sldId id="456" r:id="rId127"/>
+    <p:sldId id="455" r:id="rId128"/>
+    <p:sldId id="454" r:id="rId129"/>
+    <p:sldId id="453" r:id="rId130"/>
+    <p:sldId id="375" r:id="rId131"/>
   </p:sldIdLst>
   <p:sldSz cx="9144000" cy="6858000" type="screen4x3"/>
   <p:notesSz cx="6858000" cy="9144000"/>
@@ -333,7 +337,7 @@
           <a:p>
             <a:fld id="{CA381BD1-FF1E-4F6A-AAED-72C05092D6E5}" type="datetimeFigureOut">
               <a:rPr lang="en-US" smtClean="0"/>
-              <a:t>2/16/2020</a:t>
+              <a:t>2/27/2020</a:t>
             </a:fld>
             <a:endParaRPr lang="en-US"/>
           </a:p>
@@ -2270,7 +2274,7 @@
           <a:p>
             <a:fld id="{547641E8-73DF-4AD2-848E-3103064331B1}" type="datetimeFigureOut">
               <a:rPr lang="en-US" smtClean="0"/>
-              <a:t>2/16/2020</a:t>
+              <a:t>2/27/2020</a:t>
             </a:fld>
             <a:endParaRPr lang="en-US"/>
           </a:p>
@@ -2438,7 +2442,7 @@
           <a:p>
             <a:fld id="{547641E8-73DF-4AD2-848E-3103064331B1}" type="datetimeFigureOut">
               <a:rPr lang="en-US" smtClean="0"/>
-              <a:t>2/16/2020</a:t>
+              <a:t>2/27/2020</a:t>
             </a:fld>
             <a:endParaRPr lang="en-US"/>
           </a:p>
@@ -2616,7 +2620,7 @@
           <a:p>
             <a:fld id="{547641E8-73DF-4AD2-848E-3103064331B1}" type="datetimeFigureOut">
               <a:rPr lang="en-US" smtClean="0"/>
-              <a:t>2/16/2020</a:t>
+              <a:t>2/27/2020</a:t>
             </a:fld>
             <a:endParaRPr lang="en-US"/>
           </a:p>
@@ -2863,7 +2867,7 @@
                 </a:solidFill>
               </a:rPr>
               <a:pPr/>
-              <a:t>2/16/2020</a:t>
+              <a:t>2/27/2020</a:t>
             </a:fld>
             <a:endParaRPr lang="en-US">
               <a:solidFill>
@@ -3063,7 +3067,7 @@
                 </a:solidFill>
               </a:rPr>
               <a:pPr/>
-              <a:t>2/16/2020</a:t>
+              <a:t>2/27/2020</a:t>
             </a:fld>
             <a:endParaRPr lang="en-US">
               <a:solidFill>
@@ -3340,7 +3344,7 @@
                 </a:solidFill>
               </a:rPr>
               <a:pPr/>
-              <a:t>2/16/2020</a:t>
+              <a:t>2/27/2020</a:t>
             </a:fld>
             <a:endParaRPr lang="en-US">
               <a:solidFill>
@@ -3657,7 +3661,7 @@
                 </a:solidFill>
               </a:rPr>
               <a:pPr/>
-              <a:t>2/16/2020</a:t>
+              <a:t>2/27/2020</a:t>
             </a:fld>
             <a:endParaRPr lang="en-US">
               <a:solidFill>
@@ -4108,7 +4112,7 @@
                 </a:solidFill>
               </a:rPr>
               <a:pPr/>
-              <a:t>2/16/2020</a:t>
+              <a:t>2/27/2020</a:t>
             </a:fld>
             <a:endParaRPr lang="en-US">
               <a:solidFill>
@@ -4257,7 +4261,7 @@
                 </a:solidFill>
               </a:rPr>
               <a:pPr/>
-              <a:t>2/16/2020</a:t>
+              <a:t>2/27/2020</a:t>
             </a:fld>
             <a:endParaRPr lang="en-US">
               <a:solidFill>
@@ -4384,7 +4388,7 @@
                 </a:solidFill>
               </a:rPr>
               <a:pPr/>
-              <a:t>2/16/2020</a:t>
+              <a:t>2/27/2020</a:t>
             </a:fld>
             <a:endParaRPr lang="en-US">
               <a:solidFill>
@@ -4691,7 +4695,7 @@
                 </a:solidFill>
               </a:rPr>
               <a:pPr/>
-              <a:t>2/16/2020</a:t>
+              <a:t>2/27/2020</a:t>
             </a:fld>
             <a:endParaRPr lang="en-US">
               <a:solidFill>
@@ -4884,7 +4888,7 @@
           <a:p>
             <a:fld id="{547641E8-73DF-4AD2-848E-3103064331B1}" type="datetimeFigureOut">
               <a:rPr lang="en-US" smtClean="0"/>
-              <a:t>2/16/2020</a:t>
+              <a:t>2/27/2020</a:t>
             </a:fld>
             <a:endParaRPr lang="en-US"/>
           </a:p>
@@ -5143,7 +5147,7 @@
                 </a:solidFill>
               </a:rPr>
               <a:pPr/>
-              <a:t>2/16/2020</a:t>
+              <a:t>2/27/2020</a:t>
             </a:fld>
             <a:endParaRPr lang="en-US">
               <a:solidFill>
@@ -5343,7 +5347,7 @@
                 </a:solidFill>
               </a:rPr>
               <a:pPr/>
-              <a:t>2/16/2020</a:t>
+              <a:t>2/27/2020</a:t>
             </a:fld>
             <a:endParaRPr lang="en-US">
               <a:solidFill>
@@ -5553,7 +5557,7 @@
                 </a:solidFill>
               </a:rPr>
               <a:pPr/>
-              <a:t>2/16/2020</a:t>
+              <a:t>2/27/2020</a:t>
             </a:fld>
             <a:endParaRPr lang="en-US">
               <a:solidFill>
@@ -5823,7 +5827,7 @@
           <a:p>
             <a:fld id="{547641E8-73DF-4AD2-848E-3103064331B1}" type="datetimeFigureOut">
               <a:rPr lang="en-US" smtClean="0"/>
-              <a:t>2/16/2020</a:t>
+              <a:t>2/27/2020</a:t>
             </a:fld>
             <a:endParaRPr lang="en-US"/>
           </a:p>
@@ -6108,7 +6112,7 @@
           <a:p>
             <a:fld id="{547641E8-73DF-4AD2-848E-3103064331B1}" type="datetimeFigureOut">
               <a:rPr lang="en-US" smtClean="0"/>
-              <a:t>2/16/2020</a:t>
+              <a:t>2/27/2020</a:t>
             </a:fld>
             <a:endParaRPr lang="en-US"/>
           </a:p>
@@ -6527,7 +6531,7 @@
           <a:p>
             <a:fld id="{547641E8-73DF-4AD2-848E-3103064331B1}" type="datetimeFigureOut">
               <a:rPr lang="en-US" smtClean="0"/>
-              <a:t>2/16/2020</a:t>
+              <a:t>2/27/2020</a:t>
             </a:fld>
             <a:endParaRPr lang="en-US"/>
           </a:p>
@@ -6644,7 +6648,7 @@
           <a:p>
             <a:fld id="{547641E8-73DF-4AD2-848E-3103064331B1}" type="datetimeFigureOut">
               <a:rPr lang="en-US" smtClean="0"/>
-              <a:t>2/16/2020</a:t>
+              <a:t>2/27/2020</a:t>
             </a:fld>
             <a:endParaRPr lang="en-US"/>
           </a:p>
@@ -6739,7 +6743,7 @@
           <a:p>
             <a:fld id="{547641E8-73DF-4AD2-848E-3103064331B1}" type="datetimeFigureOut">
               <a:rPr lang="en-US" smtClean="0"/>
-              <a:t>2/16/2020</a:t>
+              <a:t>2/27/2020</a:t>
             </a:fld>
             <a:endParaRPr lang="en-US"/>
           </a:p>
@@ -7014,7 +7018,7 @@
           <a:p>
             <a:fld id="{547641E8-73DF-4AD2-848E-3103064331B1}" type="datetimeFigureOut">
               <a:rPr lang="en-US" smtClean="0"/>
-              <a:t>2/16/2020</a:t>
+              <a:t>2/27/2020</a:t>
             </a:fld>
             <a:endParaRPr lang="en-US"/>
           </a:p>
@@ -7266,7 +7270,7 @@
           <a:p>
             <a:fld id="{547641E8-73DF-4AD2-848E-3103064331B1}" type="datetimeFigureOut">
               <a:rPr lang="en-US" smtClean="0"/>
-              <a:t>2/16/2020</a:t>
+              <a:t>2/27/2020</a:t>
             </a:fld>
             <a:endParaRPr lang="en-US"/>
           </a:p>
@@ -7480,7 +7484,7 @@
           <a:p>
             <a:fld id="{547641E8-73DF-4AD2-848E-3103064331B1}" type="datetimeFigureOut">
               <a:rPr lang="en-US" smtClean="0"/>
-              <a:t>2/16/2020</a:t>
+              <a:t>2/27/2020</a:t>
             </a:fld>
             <a:endParaRPr lang="en-US"/>
           </a:p>
@@ -7995,7 +7999,7 @@
                 </a:solidFill>
               </a:rPr>
               <a:pPr/>
-              <a:t>2/16/2020</a:t>
+              <a:t>2/27/2020</a:t>
             </a:fld>
             <a:endParaRPr lang="en-US">
               <a:solidFill>
@@ -8878,15 +8882,7 @@
             <a:pPr lvl="1"/>
             <a:r>
               <a:rPr lang="en-US" dirty="0"/>
-              <a:t>I know how to write code, and I </a:t>
-            </a:r>
-            <a:r>
-              <a:rPr lang="en-US"/>
-              <a:t>can hardcode </a:t>
-            </a:r>
-            <a:r>
-              <a:rPr lang="en-US" dirty="0"/>
-              <a:t>my own data into a script, but I usually have data stored in some file that I need to work with.</a:t>
+              <a:t>I know how to write code, and I can hardcode my own data into a script, but I usually have data stored in some file that I need to work with.</a:t>
             </a:r>
           </a:p>
           <a:p>
@@ -8908,7 +8904,7 @@
                   <a:srgbClr val="FFC000"/>
                 </a:solidFill>
               </a:rPr>
-              <a:t>What files can Python read?</a:t>
+              <a:t>What files can Python access with open() or with?</a:t>
             </a:r>
           </a:p>
         </p:txBody>
@@ -8991,7 +8987,9 @@
         </p:nvSpPr>
         <p:spPr/>
         <p:txBody>
-          <a:bodyPr/>
+          <a:bodyPr>
+            <a:normAutofit/>
+          </a:bodyPr>
           <a:lstStyle/>
           <a:p>
             <a:r>
@@ -9018,7 +9016,7 @@
             </a:r>
           </a:p>
           <a:p>
-            <a:pPr lvl="1"/>
+            <a:pPr lvl="2"/>
             <a:r>
               <a:rPr lang="en-US" dirty="0"/>
               <a:t>open(</a:t>
@@ -9033,23 +9031,71 @@
             </a:r>
           </a:p>
           <a:p>
+            <a:pPr lvl="3"/>
+            <a:r>
+              <a:rPr lang="en-US" dirty="0" err="1">
+                <a:latin typeface="Consolas" panose="020B0609020204030204" pitchFamily="49" charset="0"/>
+              </a:rPr>
+              <a:t>fileHandle</a:t>
+            </a:r>
+            <a:r>
+              <a:rPr lang="en-US" dirty="0">
+                <a:latin typeface="Consolas" panose="020B0609020204030204" pitchFamily="49" charset="0"/>
+              </a:rPr>
+              <a:t> = open(</a:t>
+            </a:r>
+            <a:r>
+              <a:rPr lang="en-US" dirty="0" err="1">
+                <a:latin typeface="Consolas" panose="020B0609020204030204" pitchFamily="49" charset="0"/>
+              </a:rPr>
+              <a:t>filePath,mode</a:t>
+            </a:r>
+            <a:r>
+              <a:rPr lang="en-US" dirty="0">
+                <a:latin typeface="Consolas" panose="020B0609020204030204" pitchFamily="49" charset="0"/>
+              </a:rPr>
+              <a:t>=“mode”)</a:t>
+            </a:r>
+          </a:p>
+          <a:p>
+            <a:pPr lvl="2"/>
+            <a:r>
+              <a:rPr lang="en-US" dirty="0"/>
+              <a:t>Requires file to manually be closed</a:t>
+            </a:r>
+          </a:p>
+          <a:p>
+            <a:pPr lvl="2"/>
+            <a:r>
+              <a:rPr lang="en-US" dirty="0"/>
+              <a:t>Not preferred method</a:t>
+            </a:r>
+          </a:p>
+          <a:p>
             <a:pPr lvl="1"/>
             <a:r>
-              <a:rPr lang="en-US"/>
-              <a:t>with </a:t>
-            </a:r>
-            <a:r>
-              <a:rPr lang="en-US" dirty="0"/>
-              <a:t>open(</a:t>
-            </a:r>
-            <a:r>
-              <a:rPr lang="en-US" dirty="0" err="1"/>
-              <a:t>filepath,mode</a:t>
-            </a:r>
-            <a:r>
-              <a:rPr lang="en-US" dirty="0"/>
-              <a:t>) as file:</a:t>
-            </a:r>
+              <a:rPr lang="en-US" dirty="0"/>
+              <a:t>close() command</a:t>
+            </a:r>
+          </a:p>
+          <a:p>
+            <a:pPr lvl="2"/>
+            <a:r>
+              <a:rPr lang="en-US" dirty="0" err="1">
+                <a:latin typeface="Consolas" panose="020B0609020204030204" pitchFamily="49" charset="0"/>
+              </a:rPr>
+              <a:t>fileHandle.close</a:t>
+            </a:r>
+            <a:r>
+              <a:rPr lang="en-US" dirty="0">
+                <a:latin typeface="Consolas" panose="020B0609020204030204" pitchFamily="49" charset="0"/>
+              </a:rPr>
+              <a:t>()</a:t>
+            </a:r>
+          </a:p>
+          <a:p>
+            <a:pPr lvl="3"/>
+            <a:endParaRPr lang="en-US" dirty="0"/>
           </a:p>
           <a:p>
             <a:pPr lvl="1"/>
@@ -9146,6 +9192,176 @@
           <a:p>
             <a:pPr lvl="1"/>
             <a:r>
+              <a:rPr lang="en-US" dirty="0">
+                <a:solidFill>
+                  <a:srgbClr val="FFC000"/>
+                </a:solidFill>
+              </a:rPr>
+              <a:t>How do I access data from files?</a:t>
+            </a:r>
+          </a:p>
+          <a:p>
+            <a:pPr lvl="1"/>
+            <a:r>
+              <a:rPr lang="en-US" dirty="0"/>
+              <a:t>with statement</a:t>
+            </a:r>
+          </a:p>
+          <a:p>
+            <a:pPr lvl="2"/>
+            <a:r>
+              <a:rPr lang="en-US" dirty="0">
+                <a:latin typeface="Consolas" panose="020B0609020204030204" pitchFamily="49" charset="0"/>
+              </a:rPr>
+              <a:t>with open(</a:t>
+            </a:r>
+            <a:r>
+              <a:rPr lang="en-US" dirty="0" err="1">
+                <a:latin typeface="Consolas" panose="020B0609020204030204" pitchFamily="49" charset="0"/>
+              </a:rPr>
+              <a:t>filepath,mode</a:t>
+            </a:r>
+            <a:r>
+              <a:rPr lang="en-US" dirty="0">
+                <a:latin typeface="Consolas" panose="020B0609020204030204" pitchFamily="49" charset="0"/>
+              </a:rPr>
+              <a:t>) as file:</a:t>
+            </a:r>
+          </a:p>
+          <a:p>
+            <a:pPr lvl="2"/>
+            <a:r>
+              <a:rPr lang="en-US" dirty="0"/>
+              <a:t>Using ‘with’ automatically closes file:</a:t>
+            </a:r>
+          </a:p>
+          <a:p>
+            <a:pPr lvl="3"/>
+            <a:r>
+              <a:rPr lang="en-US" dirty="0"/>
+              <a:t>After code block finishes executing</a:t>
+            </a:r>
+          </a:p>
+          <a:p>
+            <a:pPr lvl="3"/>
+            <a:r>
+              <a:rPr lang="en-US" dirty="0"/>
+              <a:t>Exceptions</a:t>
+            </a:r>
+          </a:p>
+          <a:p>
+            <a:pPr lvl="3"/>
+            <a:r>
+              <a:rPr lang="en-US" dirty="0"/>
+              <a:t>Kernel closures</a:t>
+            </a:r>
+          </a:p>
+          <a:p>
+            <a:pPr lvl="2"/>
+            <a:r>
+              <a:rPr lang="en-US" dirty="0"/>
+              <a:t>Preferred method</a:t>
+            </a:r>
+          </a:p>
+          <a:p>
+            <a:pPr lvl="3"/>
+            <a:endParaRPr lang="en-US" dirty="0"/>
+          </a:p>
+          <a:p>
+            <a:pPr lvl="1"/>
+            <a:endParaRPr lang="en-US" dirty="0"/>
+          </a:p>
+        </p:txBody>
+      </p:sp>
+    </p:spTree>
+    <p:extLst>
+      <p:ext uri="{BB962C8B-B14F-4D97-AF65-F5344CB8AC3E}">
+        <p14:creationId xmlns:p14="http://schemas.microsoft.com/office/powerpoint/2010/main" val="378924745"/>
+      </p:ext>
+    </p:extLst>
+  </p:cSld>
+  <p:clrMapOvr>
+    <a:masterClrMapping/>
+  </p:clrMapOvr>
+</p:sld>
+</file>
+
+<file path=ppt/slides/slide105.xml><?xml version="1.0" encoding="utf-8"?>
+<p:sld xmlns:a="http://schemas.openxmlformats.org/drawingml/2006/main" xmlns:r="http://schemas.openxmlformats.org/officeDocument/2006/relationships" xmlns:p="http://schemas.openxmlformats.org/presentationml/2006/main">
+  <p:cSld>
+    <p:bg>
+      <p:bgPr>
+        <a:blipFill dpi="0" rotWithShape="1">
+          <a:blip r:embed="rId2">
+            <a:lum/>
+          </a:blip>
+          <a:srcRect/>
+          <a:stretch>
+            <a:fillRect l="-10000" r="-10000"/>
+          </a:stretch>
+        </a:blipFill>
+        <a:effectLst/>
+      </p:bgPr>
+    </p:bg>
+    <p:spTree>
+      <p:nvGrpSpPr>
+        <p:cNvPr id="1" name=""/>
+        <p:cNvGrpSpPr/>
+        <p:nvPr/>
+      </p:nvGrpSpPr>
+      <p:grpSpPr>
+        <a:xfrm>
+          <a:off x="0" y="0"/>
+          <a:ext cx="0" cy="0"/>
+          <a:chOff x="0" y="0"/>
+          <a:chExt cx="0" cy="0"/>
+        </a:xfrm>
+      </p:grpSpPr>
+      <p:sp>
+        <p:nvSpPr>
+          <p:cNvPr id="2" name="Title 1"/>
+          <p:cNvSpPr>
+            <a:spLocks noGrp="1"/>
+          </p:cNvSpPr>
+          <p:nvPr>
+            <p:ph type="title"/>
+          </p:nvPr>
+        </p:nvSpPr>
+        <p:spPr/>
+        <p:txBody>
+          <a:bodyPr/>
+          <a:lstStyle/>
+          <a:p>
+            <a:r>
+              <a:rPr lang="en-US" dirty="0"/>
+              <a:t>Working with Files</a:t>
+            </a:r>
+          </a:p>
+        </p:txBody>
+      </p:sp>
+      <p:sp>
+        <p:nvSpPr>
+          <p:cNvPr id="3" name="Content Placeholder 2"/>
+          <p:cNvSpPr>
+            <a:spLocks noGrp="1"/>
+          </p:cNvSpPr>
+          <p:nvPr>
+            <p:ph idx="1"/>
+          </p:nvPr>
+        </p:nvSpPr>
+        <p:spPr/>
+        <p:txBody>
+          <a:bodyPr/>
+          <a:lstStyle/>
+          <a:p>
+            <a:r>
+              <a:rPr lang="en-US" dirty="0"/>
+              <a:t>Working with Files</a:t>
+            </a:r>
+          </a:p>
+          <a:p>
+            <a:pPr lvl="1"/>
+            <a:r>
               <a:rPr lang="en-US" dirty="0"/>
               <a:t>File Access Modes</a:t>
             </a:r>
@@ -9167,28 +9383,28 @@
           <p:nvPr>
             <p:extLst>
               <p:ext uri="{D42A27DB-BD31-4B8C-83A1-F6EECF244321}">
-                <p14:modId xmlns:p14="http://schemas.microsoft.com/office/powerpoint/2010/main" val="3140197483"/>
+                <p14:modId xmlns:p14="http://schemas.microsoft.com/office/powerpoint/2010/main" val="4274444952"/>
               </p:ext>
             </p:extLst>
           </p:nvPr>
         </p:nvGraphicFramePr>
         <p:xfrm>
-          <a:off x="1181100" y="2895600"/>
-          <a:ext cx="6781800" cy="3474720"/>
+          <a:off x="781050" y="3124200"/>
+          <a:ext cx="7581900" cy="2926080"/>
         </p:xfrm>
         <a:graphic>
           <a:graphicData uri="http://schemas.openxmlformats.org/drawingml/2006/table">
             <a:tbl>
               <a:tblPr/>
               <a:tblGrid>
-                <a:gridCol w="1600200">
+                <a:gridCol w="1788988">
                   <a:extLst>
                     <a:ext uri="{9D8B030D-6E8A-4147-A177-3AD203B41FA5}">
                       <a16:colId xmlns:a16="http://schemas.microsoft.com/office/drawing/2014/main" val="1325383276"/>
                     </a:ext>
                   </a:extLst>
                 </a:gridCol>
-                <a:gridCol w="5181600">
+                <a:gridCol w="5792912">
                   <a:extLst>
                     <a:ext uri="{9D8B030D-6E8A-4147-A177-3AD203B41FA5}">
                       <a16:colId xmlns:a16="http://schemas.microsoft.com/office/drawing/2014/main" val="2308185294"/>
@@ -9211,7 +9427,7 @@
                             </a:schemeClr>
                           </a:solidFill>
                         </a:rPr>
-                        <a:t>Character</a:t>
+                        <a:t>Character/Token</a:t>
                       </a:r>
                     </a:p>
                   </a:txBody>
@@ -10153,101 +10369,6 @@
 </p:sld>
 </file>
 
-<file path=ppt/slides/slide105.xml><?xml version="1.0" encoding="utf-8"?>
-<p:sld xmlns:a="http://schemas.openxmlformats.org/drawingml/2006/main" xmlns:r="http://schemas.openxmlformats.org/officeDocument/2006/relationships" xmlns:p="http://schemas.openxmlformats.org/presentationml/2006/main">
-  <p:cSld>
-    <p:bg>
-      <p:bgPr>
-        <a:blipFill dpi="0" rotWithShape="1">
-          <a:blip r:embed="rId2">
-            <a:lum/>
-          </a:blip>
-          <a:srcRect/>
-          <a:stretch>
-            <a:fillRect l="-10000" r="-10000"/>
-          </a:stretch>
-        </a:blipFill>
-        <a:effectLst/>
-      </p:bgPr>
-    </p:bg>
-    <p:spTree>
-      <p:nvGrpSpPr>
-        <p:cNvPr id="1" name=""/>
-        <p:cNvGrpSpPr/>
-        <p:nvPr/>
-      </p:nvGrpSpPr>
-      <p:grpSpPr>
-        <a:xfrm>
-          <a:off x="0" y="0"/>
-          <a:ext cx="0" cy="0"/>
-          <a:chOff x="0" y="0"/>
-          <a:chExt cx="0" cy="0"/>
-        </a:xfrm>
-      </p:grpSpPr>
-      <p:sp>
-        <p:nvSpPr>
-          <p:cNvPr id="2" name="Title 1"/>
-          <p:cNvSpPr>
-            <a:spLocks noGrp="1"/>
-          </p:cNvSpPr>
-          <p:nvPr>
-            <p:ph type="title"/>
-          </p:nvPr>
-        </p:nvSpPr>
-        <p:spPr/>
-        <p:txBody>
-          <a:bodyPr/>
-          <a:lstStyle/>
-          <a:p>
-            <a:r>
-              <a:rPr lang="en-US" dirty="0"/>
-              <a:t>Working with Files</a:t>
-            </a:r>
-          </a:p>
-        </p:txBody>
-      </p:sp>
-      <p:sp>
-        <p:nvSpPr>
-          <p:cNvPr id="3" name="Content Placeholder 2"/>
-          <p:cNvSpPr>
-            <a:spLocks noGrp="1"/>
-          </p:cNvSpPr>
-          <p:nvPr>
-            <p:ph idx="1"/>
-          </p:nvPr>
-        </p:nvSpPr>
-        <p:spPr/>
-        <p:txBody>
-          <a:bodyPr/>
-          <a:lstStyle/>
-          <a:p>
-            <a:r>
-              <a:rPr lang="en-US" dirty="0"/>
-              <a:t>Working with Files</a:t>
-            </a:r>
-          </a:p>
-          <a:p>
-            <a:pPr lvl="1"/>
-            <a:r>
-              <a:rPr lang="en-US" dirty="0"/>
-              <a:t>Examples at ./Instructional Material/Class Examples/File Access Examples/File Access Examples.py</a:t>
-            </a:r>
-          </a:p>
-        </p:txBody>
-      </p:sp>
-    </p:spTree>
-    <p:extLst>
-      <p:ext uri="{BB962C8B-B14F-4D97-AF65-F5344CB8AC3E}">
-        <p14:creationId xmlns:p14="http://schemas.microsoft.com/office/powerpoint/2010/main" val="2822917824"/>
-      </p:ext>
-    </p:extLst>
-  </p:cSld>
-  <p:clrMapOvr>
-    <a:masterClrMapping/>
-  </p:clrMapOvr>
-</p:sld>
-</file>
-
 <file path=ppt/slides/slide106.xml><?xml version="1.0" encoding="utf-8"?>
 <p:sld xmlns:a="http://schemas.openxmlformats.org/drawingml/2006/main" xmlns:r="http://schemas.openxmlformats.org/officeDocument/2006/relationships" xmlns:p="http://schemas.openxmlformats.org/presentationml/2006/main">
   <p:cSld>
@@ -10331,7 +10452,7 @@
                   <a:srgbClr val="FFC000"/>
                 </a:solidFill>
               </a:rPr>
-              <a:t>What files can Python read?</a:t>
+              <a:t>What files can Python access with open() or with?</a:t>
             </a:r>
           </a:p>
           <a:p>
@@ -10467,7 +10588,7 @@
                   <a:srgbClr val="FFC000"/>
                 </a:solidFill>
               </a:rPr>
-              <a:t>What files can Python read?</a:t>
+              <a:t>What files can Python access with open() or with?</a:t>
             </a:r>
           </a:p>
           <a:p>
@@ -10627,7 +10748,7 @@
                   <a:srgbClr val="FFC000"/>
                 </a:solidFill>
               </a:rPr>
-              <a:t>What files can Python read?</a:t>
+              <a:t>What files can Python access with open() or with?</a:t>
             </a:r>
           </a:p>
           <a:p>
@@ -10806,14 +10927,12 @@
         </p:nvSpPr>
         <p:spPr/>
         <p:txBody>
-          <a:bodyPr>
-            <a:normAutofit/>
-          </a:bodyPr>
-          <a:lstStyle/>
-          <a:p>
-            <a:r>
-              <a:rPr lang="en-US" dirty="0"/>
-              <a:t>Working with Dates</a:t>
+          <a:bodyPr/>
+          <a:lstStyle/>
+          <a:p>
+            <a:r>
+              <a:rPr lang="en-US" dirty="0"/>
+              <a:t>Working with Files</a:t>
             </a:r>
           </a:p>
         </p:txBody>
@@ -10835,33 +10954,40 @@
           <a:p>
             <a:r>
               <a:rPr lang="en-US" dirty="0"/>
-              <a:t>Working with Dates</a:t>
+              <a:t>Working with Files</a:t>
             </a:r>
           </a:p>
           <a:p>
             <a:pPr lvl="1"/>
             <a:r>
               <a:rPr lang="en-US" dirty="0"/>
-              <a:t>Problem: I can now get data from files, or am getting data from a database system, but all the dates are stored as strings.   This makes it hard to add or subtract days, months, and/or years.</a:t>
-            </a:r>
-          </a:p>
-          <a:p>
-            <a:pPr lvl="1"/>
-            <a:r>
-              <a:rPr lang="en-US" dirty="0">
-                <a:solidFill>
-                  <a:srgbClr val="FFC000"/>
-                </a:solidFill>
-              </a:rPr>
-              <a:t>How can I manipulate dates?</a:t>
-            </a:r>
+              <a:t>Examples at </a:t>
+            </a:r>
+          </a:p>
+          <a:p>
+            <a:pPr lvl="2"/>
+            <a:r>
+              <a:rPr lang="en-US" dirty="0"/>
+              <a:t>./Instructional Material/Class Examples/File Access Examples/File Access Examples.py</a:t>
+            </a:r>
+          </a:p>
+          <a:p>
+            <a:pPr lvl="2"/>
+            <a:r>
+              <a:rPr lang="en-US" dirty="0"/>
+              <a:t>./Instructional Material/Class Examples/File Access Examples/File Read and Write Examples.py</a:t>
+            </a:r>
+          </a:p>
+          <a:p>
+            <a:pPr lvl="2"/>
+            <a:endParaRPr lang="en-US" dirty="0"/>
           </a:p>
         </p:txBody>
       </p:sp>
     </p:spTree>
     <p:extLst>
       <p:ext uri="{BB962C8B-B14F-4D97-AF65-F5344CB8AC3E}">
-        <p14:creationId xmlns:p14="http://schemas.microsoft.com/office/powerpoint/2010/main" val="1060372174"/>
+        <p14:creationId xmlns:p14="http://schemas.microsoft.com/office/powerpoint/2010/main" val="2822917824"/>
       </p:ext>
     </p:extLst>
   </p:cSld>
@@ -11012,369 +11138,11 @@
 <file path=ppt/slides/slide110.xml><?xml version="1.0" encoding="utf-8"?>
 <p:sld xmlns:a="http://schemas.openxmlformats.org/drawingml/2006/main" xmlns:r="http://schemas.openxmlformats.org/officeDocument/2006/relationships" xmlns:p="http://schemas.openxmlformats.org/presentationml/2006/main">
   <p:cSld>
-    <p:spTree>
-      <p:nvGrpSpPr>
-        <p:cNvPr id="1" name=""/>
-        <p:cNvGrpSpPr/>
-        <p:nvPr/>
-      </p:nvGrpSpPr>
-      <p:grpSpPr>
-        <a:xfrm>
-          <a:off x="0" y="0"/>
-          <a:ext cx="0" cy="0"/>
-          <a:chOff x="0" y="0"/>
-          <a:chExt cx="0" cy="0"/>
-        </a:xfrm>
-      </p:grpSpPr>
-      <p:sp>
-        <p:nvSpPr>
-          <p:cNvPr id="2" name="Title 1"/>
-          <p:cNvSpPr>
-            <a:spLocks noGrp="1"/>
-          </p:cNvSpPr>
-          <p:nvPr>
-            <p:ph type="title"/>
-          </p:nvPr>
-        </p:nvSpPr>
-        <p:spPr/>
-        <p:txBody>
-          <a:bodyPr>
-            <a:normAutofit/>
-          </a:bodyPr>
-          <a:lstStyle/>
-          <a:p>
-            <a:r>
-              <a:rPr lang="en-US" dirty="0"/>
-              <a:t>Working with Dates</a:t>
-            </a:r>
-          </a:p>
-        </p:txBody>
-      </p:sp>
-      <p:sp>
-        <p:nvSpPr>
-          <p:cNvPr id="3" name="Content Placeholder 2"/>
-          <p:cNvSpPr>
-            <a:spLocks noGrp="1"/>
-          </p:cNvSpPr>
-          <p:nvPr>
-            <p:ph idx="1"/>
-          </p:nvPr>
-        </p:nvSpPr>
-        <p:spPr/>
-        <p:txBody>
-          <a:bodyPr>
-            <a:normAutofit/>
-          </a:bodyPr>
-          <a:lstStyle/>
-          <a:p>
-            <a:r>
-              <a:rPr lang="en-US" dirty="0"/>
-              <a:t>Datetime Library</a:t>
-            </a:r>
-          </a:p>
-          <a:p>
-            <a:pPr lvl="1"/>
-            <a:r>
-              <a:rPr lang="en-US" dirty="0"/>
-              <a:t>Functions</a:t>
-            </a:r>
-          </a:p>
-          <a:p>
-            <a:pPr lvl="2"/>
-            <a:r>
-              <a:rPr lang="en-US" dirty="0" err="1"/>
-              <a:t>Datetime.datetime.Strptime</a:t>
-            </a:r>
-            <a:r>
-              <a:rPr lang="en-US" dirty="0"/>
-              <a:t>()</a:t>
-            </a:r>
-          </a:p>
-          <a:p>
-            <a:pPr lvl="2"/>
-            <a:r>
-              <a:rPr lang="en-US" dirty="0" err="1"/>
-              <a:t>Datetime.datetime.Strftime</a:t>
-            </a:r>
-            <a:r>
-              <a:rPr lang="en-US" dirty="0"/>
-              <a:t>()</a:t>
-            </a:r>
-          </a:p>
-          <a:p>
-            <a:pPr lvl="2"/>
-            <a:r>
-              <a:rPr lang="en-US" dirty="0" err="1"/>
-              <a:t>Datetime.timedelta</a:t>
-            </a:r>
-            <a:endParaRPr lang="en-US" dirty="0"/>
-          </a:p>
-          <a:p>
-            <a:pPr lvl="1"/>
-            <a:r>
-              <a:rPr lang="en-US" dirty="0"/>
-              <a:t>How data is stored</a:t>
-            </a:r>
-          </a:p>
-          <a:p>
-            <a:pPr lvl="1"/>
-            <a:r>
-              <a:rPr lang="en-US" dirty="0"/>
-              <a:t>Getting specific parts of a datetime</a:t>
-            </a:r>
-          </a:p>
-          <a:p>
-            <a:pPr lvl="2"/>
-            <a:r>
-              <a:rPr lang="en-US" dirty="0"/>
-              <a:t>Hours, days, </a:t>
-            </a:r>
-            <a:r>
-              <a:rPr lang="en-US" dirty="0" err="1"/>
-              <a:t>etc</a:t>
-            </a:r>
-            <a:endParaRPr lang="en-US" dirty="0"/>
-          </a:p>
-          <a:p>
-            <a:pPr lvl="1"/>
-            <a:r>
-              <a:rPr lang="en-US" dirty="0"/>
-              <a:t>Limitations: can only use periods up to a month</a:t>
-            </a:r>
-          </a:p>
-        </p:txBody>
-      </p:sp>
-    </p:spTree>
-    <p:extLst>
-      <p:ext uri="{BB962C8B-B14F-4D97-AF65-F5344CB8AC3E}">
-        <p14:creationId xmlns:p14="http://schemas.microsoft.com/office/powerpoint/2010/main" val="156179251"/>
-      </p:ext>
-    </p:extLst>
-  </p:cSld>
-  <p:clrMapOvr>
-    <a:masterClrMapping/>
-  </p:clrMapOvr>
-</p:sld>
-</file>
-
-<file path=ppt/slides/slide111.xml><?xml version="1.0" encoding="utf-8"?>
-<p:sld xmlns:a="http://schemas.openxmlformats.org/drawingml/2006/main" xmlns:r="http://schemas.openxmlformats.org/officeDocument/2006/relationships" xmlns:p="http://schemas.openxmlformats.org/presentationml/2006/main">
-  <p:cSld>
-    <p:spTree>
-      <p:nvGrpSpPr>
-        <p:cNvPr id="1" name=""/>
-        <p:cNvGrpSpPr/>
-        <p:nvPr/>
-      </p:nvGrpSpPr>
-      <p:grpSpPr>
-        <a:xfrm>
-          <a:off x="0" y="0"/>
-          <a:ext cx="0" cy="0"/>
-          <a:chOff x="0" y="0"/>
-          <a:chExt cx="0" cy="0"/>
-        </a:xfrm>
-      </p:grpSpPr>
-      <p:sp>
-        <p:nvSpPr>
-          <p:cNvPr id="2" name="Title 1"/>
-          <p:cNvSpPr>
-            <a:spLocks noGrp="1"/>
-          </p:cNvSpPr>
-          <p:nvPr>
-            <p:ph type="title"/>
-          </p:nvPr>
-        </p:nvSpPr>
-        <p:spPr/>
-        <p:txBody>
-          <a:bodyPr>
-            <a:normAutofit/>
-          </a:bodyPr>
-          <a:lstStyle/>
-          <a:p>
-            <a:r>
-              <a:rPr lang="en-US" dirty="0"/>
-              <a:t>Working with Dates</a:t>
-            </a:r>
-          </a:p>
-        </p:txBody>
-      </p:sp>
-      <p:sp>
-        <p:nvSpPr>
-          <p:cNvPr id="3" name="Content Placeholder 2"/>
-          <p:cNvSpPr>
-            <a:spLocks noGrp="1"/>
-          </p:cNvSpPr>
-          <p:nvPr>
-            <p:ph idx="1"/>
-          </p:nvPr>
-        </p:nvSpPr>
-        <p:spPr/>
-        <p:txBody>
-          <a:bodyPr>
-            <a:normAutofit/>
-          </a:bodyPr>
-          <a:lstStyle/>
-          <a:p>
-            <a:r>
-              <a:rPr lang="en-US" dirty="0" err="1"/>
-              <a:t>DateUtil</a:t>
-            </a:r>
-            <a:r>
-              <a:rPr lang="en-US" dirty="0"/>
-              <a:t> Library</a:t>
-            </a:r>
-          </a:p>
-          <a:p>
-            <a:pPr lvl="1"/>
-            <a:r>
-              <a:rPr lang="en-US" dirty="0"/>
-              <a:t>Compatible with datetime library</a:t>
-            </a:r>
-          </a:p>
-          <a:p>
-            <a:pPr lvl="2"/>
-            <a:r>
-              <a:rPr lang="en-US"/>
-              <a:t>Same objects</a:t>
-            </a:r>
-          </a:p>
-          <a:p>
-            <a:pPr lvl="1"/>
-            <a:r>
-              <a:rPr lang="en-US" dirty="0" err="1"/>
-              <a:t>Dateutil.relativedelta.relativedelta</a:t>
-            </a:r>
-            <a:r>
-              <a:rPr lang="en-US" dirty="0"/>
-              <a:t>()</a:t>
-            </a:r>
-          </a:p>
-          <a:p>
-            <a:pPr lvl="2"/>
-            <a:r>
-              <a:rPr lang="en-US" dirty="0"/>
-              <a:t>Periods up to a year</a:t>
-            </a:r>
-          </a:p>
-        </p:txBody>
-      </p:sp>
-    </p:spTree>
-    <p:extLst>
-      <p:ext uri="{BB962C8B-B14F-4D97-AF65-F5344CB8AC3E}">
-        <p14:creationId xmlns:p14="http://schemas.microsoft.com/office/powerpoint/2010/main" val="1561744575"/>
-      </p:ext>
-    </p:extLst>
-  </p:cSld>
-  <p:clrMapOvr>
-    <a:masterClrMapping/>
-  </p:clrMapOvr>
-</p:sld>
-</file>
-
-<file path=ppt/slides/slide112.xml><?xml version="1.0" encoding="utf-8"?>
-<p:sld xmlns:a="http://schemas.openxmlformats.org/drawingml/2006/main" xmlns:r="http://schemas.openxmlformats.org/officeDocument/2006/relationships" xmlns:p="http://schemas.openxmlformats.org/presentationml/2006/main">
-  <p:cSld>
-    <p:spTree>
-      <p:nvGrpSpPr>
-        <p:cNvPr id="1" name=""/>
-        <p:cNvGrpSpPr/>
-        <p:nvPr/>
-      </p:nvGrpSpPr>
-      <p:grpSpPr>
-        <a:xfrm>
-          <a:off x="0" y="0"/>
-          <a:ext cx="0" cy="0"/>
-          <a:chOff x="0" y="0"/>
-          <a:chExt cx="0" cy="0"/>
-        </a:xfrm>
-      </p:grpSpPr>
-      <p:sp>
-        <p:nvSpPr>
-          <p:cNvPr id="2" name="Title 1"/>
-          <p:cNvSpPr>
-            <a:spLocks noGrp="1"/>
-          </p:cNvSpPr>
-          <p:nvPr>
-            <p:ph type="title"/>
-          </p:nvPr>
-        </p:nvSpPr>
-        <p:spPr/>
-        <p:txBody>
-          <a:bodyPr>
-            <a:normAutofit/>
-          </a:bodyPr>
-          <a:lstStyle/>
-          <a:p>
-            <a:r>
-              <a:rPr lang="en-US" dirty="0"/>
-              <a:t>Working with Dates</a:t>
-            </a:r>
-          </a:p>
-        </p:txBody>
-      </p:sp>
-      <p:sp>
-        <p:nvSpPr>
-          <p:cNvPr id="3" name="Content Placeholder 2"/>
-          <p:cNvSpPr>
-            <a:spLocks noGrp="1"/>
-          </p:cNvSpPr>
-          <p:nvPr>
-            <p:ph idx="1"/>
-          </p:nvPr>
-        </p:nvSpPr>
-        <p:spPr/>
-        <p:txBody>
-          <a:bodyPr>
-            <a:normAutofit/>
-          </a:bodyPr>
-          <a:lstStyle/>
-          <a:p>
-            <a:r>
-              <a:rPr lang="en-US" dirty="0"/>
-              <a:t>Datetime Library Side Notes</a:t>
-            </a:r>
-          </a:p>
-          <a:p>
-            <a:pPr lvl="1"/>
-            <a:r>
-              <a:rPr lang="en-US" dirty="0"/>
-              <a:t>See example script “Datetime Tutorial.py</a:t>
-            </a:r>
-          </a:p>
-        </p:txBody>
-      </p:sp>
-    </p:spTree>
-    <p:extLst>
-      <p:ext uri="{BB962C8B-B14F-4D97-AF65-F5344CB8AC3E}">
-        <p14:creationId xmlns:p14="http://schemas.microsoft.com/office/powerpoint/2010/main" val="2349402568"/>
-      </p:ext>
-    </p:extLst>
-  </p:cSld>
-  <p:clrMapOvr>
-    <a:masterClrMapping/>
-  </p:clrMapOvr>
-</p:sld>
-</file>
-
-<file path=ppt/slides/slide113.xml><?xml version="1.0" encoding="utf-8"?>
-<p:sld xmlns:a="http://schemas.openxmlformats.org/drawingml/2006/main" xmlns:r="http://schemas.openxmlformats.org/officeDocument/2006/relationships" xmlns:p="http://schemas.openxmlformats.org/presentationml/2006/main">
-  <p:cSld>
     <p:bg>
       <p:bgPr>
         <a:blipFill dpi="0" rotWithShape="1">
           <a:blip r:embed="rId2">
             <a:lum/>
-            <a:extLst>
-              <a:ext uri="{BEBA8EAE-BF5A-486C-A8C5-ECC9F3942E4B}">
-                <a14:imgProps xmlns:a14="http://schemas.microsoft.com/office/drawing/2010/main">
-                  <a14:imgLayer r:embed="rId3">
-                    <a14:imgEffect>
-                      <a14:saturation sat="63000"/>
-                    </a14:imgEffect>
-                  </a14:imgLayer>
-                </a14:imgProps>
-              </a:ext>
-            </a:extLst>
           </a:blip>
           <a:srcRect/>
           <a:stretch>
@@ -11410,6 +11178,28 @@
         </p:nvSpPr>
         <p:spPr/>
         <p:txBody>
+          <a:bodyPr/>
+          <a:lstStyle/>
+          <a:p>
+            <a:r>
+              <a:rPr lang="en-US" dirty="0"/>
+              <a:t>Working with Files</a:t>
+            </a:r>
+          </a:p>
+        </p:txBody>
+      </p:sp>
+      <p:sp>
+        <p:nvSpPr>
+          <p:cNvPr id="3" name="Content Placeholder 2"/>
+          <p:cNvSpPr>
+            <a:spLocks noGrp="1"/>
+          </p:cNvSpPr>
+          <p:nvPr>
+            <p:ph idx="1"/>
+          </p:nvPr>
+        </p:nvSpPr>
+        <p:spPr/>
+        <p:txBody>
           <a:bodyPr>
             <a:normAutofit/>
           </a:bodyPr>
@@ -11417,81 +11207,94 @@
           <a:p>
             <a:r>
               <a:rPr lang="en-US" dirty="0"/>
-              <a:t>Review of Fundamentals</a:t>
-            </a:r>
-          </a:p>
-        </p:txBody>
-      </p:sp>
-      <p:sp>
-        <p:nvSpPr>
-          <p:cNvPr id="3" name="Content Placeholder 2"/>
-          <p:cNvSpPr>
-            <a:spLocks noGrp="1"/>
-          </p:cNvSpPr>
-          <p:nvPr>
-            <p:ph idx="1"/>
-          </p:nvPr>
-        </p:nvSpPr>
-        <p:spPr/>
-        <p:txBody>
-          <a:bodyPr>
-            <a:normAutofit/>
-          </a:bodyPr>
-          <a:lstStyle/>
-          <a:p>
-            <a:r>
-              <a:rPr lang="en-US" dirty="0"/>
-              <a:t>Overview</a:t>
+              <a:t>Working with Files</a:t>
             </a:r>
           </a:p>
           <a:p>
             <a:pPr lvl="1"/>
             <a:r>
-              <a:rPr lang="en-US" dirty="0"/>
-              <a:t>Variables and datatypes</a:t>
+              <a:rPr lang="en-US" dirty="0">
+                <a:solidFill>
+                  <a:srgbClr val="FFC000"/>
+                </a:solidFill>
+              </a:rPr>
+              <a:t>Additional Notes</a:t>
             </a:r>
           </a:p>
           <a:p>
             <a:pPr lvl="1"/>
             <a:r>
-              <a:rPr lang="en-US" dirty="0"/>
-              <a:t>Collections</a:t>
+              <a:rPr lang="en-US" sz="2400" dirty="0"/>
+              <a:t>Using </a:t>
+            </a:r>
+            <a:r>
+              <a:rPr lang="en-US" sz="2400" dirty="0">
+                <a:latin typeface="Consolas" panose="020B0609020204030204" pitchFamily="49" charset="0"/>
+              </a:rPr>
+              <a:t>with</a:t>
+            </a:r>
+            <a:r>
+              <a:rPr lang="en-US" sz="2400" dirty="0"/>
+              <a:t> statement will automatically close file once code block has executed</a:t>
+            </a:r>
+          </a:p>
+          <a:p>
+            <a:pPr lvl="2"/>
+            <a:r>
+              <a:rPr lang="en-US" sz="2000" dirty="0"/>
+              <a:t>If exception occurs, ‘with’ statement will still close the file</a:t>
+            </a:r>
+          </a:p>
+          <a:p>
+            <a:pPr lvl="2"/>
+            <a:r>
+              <a:rPr lang="en-US" sz="2000" dirty="0"/>
+              <a:t>Closing kernel allows file to close</a:t>
+            </a:r>
+          </a:p>
+          <a:p>
+            <a:pPr lvl="2"/>
+            <a:r>
+              <a:rPr lang="en-US" sz="2000" dirty="0"/>
+              <a:t>Code halting will keep file open</a:t>
+            </a:r>
+          </a:p>
+          <a:p>
+            <a:pPr lvl="3"/>
+            <a:r>
+              <a:rPr lang="en-US" sz="1600" dirty="0"/>
+              <a:t>input() keeps file open</a:t>
             </a:r>
           </a:p>
           <a:p>
             <a:pPr lvl="1"/>
             <a:r>
-              <a:rPr lang="en-US" dirty="0"/>
-              <a:t>Conditional Statements/Branching Statements</a:t>
-            </a:r>
-          </a:p>
-          <a:p>
-            <a:pPr lvl="1"/>
-            <a:r>
-              <a:rPr lang="en-US" dirty="0"/>
-              <a:t>Loops</a:t>
-            </a:r>
-          </a:p>
-          <a:p>
-            <a:pPr lvl="1"/>
-            <a:r>
-              <a:rPr lang="en-US" dirty="0"/>
-              <a:t>Functions</a:t>
-            </a:r>
-          </a:p>
-          <a:p>
-            <a:pPr lvl="1"/>
-            <a:r>
-              <a:rPr lang="en-US" dirty="0"/>
-              <a:t>Working with Files</a:t>
-            </a:r>
+              <a:rPr lang="en-US" sz="2400" dirty="0"/>
+              <a:t>Check if file is still open</a:t>
+            </a:r>
+          </a:p>
+          <a:p>
+            <a:pPr lvl="2"/>
+            <a:r>
+              <a:rPr lang="en-US" sz="2000" dirty="0" err="1"/>
+              <a:t>fileHandle.closed</a:t>
+            </a:r>
+            <a:endParaRPr lang="en-US" sz="2000" dirty="0"/>
+          </a:p>
+          <a:p>
+            <a:pPr lvl="2"/>
+            <a:endParaRPr lang="en-US" sz="2000" dirty="0"/>
+          </a:p>
+          <a:p>
+            <a:pPr lvl="2"/>
+            <a:endParaRPr lang="en-US" dirty="0"/>
           </a:p>
         </p:txBody>
       </p:sp>
     </p:spTree>
     <p:extLst>
       <p:ext uri="{BB962C8B-B14F-4D97-AF65-F5344CB8AC3E}">
-        <p14:creationId xmlns:p14="http://schemas.microsoft.com/office/powerpoint/2010/main" val="1126409660"/>
+        <p14:creationId xmlns:p14="http://schemas.microsoft.com/office/powerpoint/2010/main" val="3123333626"/>
       </p:ext>
     </p:extLst>
   </p:cSld>
@@ -11501,7 +11304,7 @@
 </p:sld>
 </file>
 
-<file path=ppt/slides/slide114.xml><?xml version="1.0" encoding="utf-8"?>
+<file path=ppt/slides/slide111.xml><?xml version="1.0" encoding="utf-8"?>
 <p:sld xmlns:a="http://schemas.openxmlformats.org/drawingml/2006/main" xmlns:r="http://schemas.openxmlformats.org/officeDocument/2006/relationships" xmlns:p="http://schemas.openxmlformats.org/presentationml/2006/main">
   <p:cSld>
     <p:bg>
@@ -11509,17 +11312,6 @@
         <a:blipFill dpi="0" rotWithShape="1">
           <a:blip r:embed="rId2">
             <a:lum/>
-            <a:extLst>
-              <a:ext uri="{BEBA8EAE-BF5A-486C-A8C5-ECC9F3942E4B}">
-                <a14:imgProps xmlns:a14="http://schemas.microsoft.com/office/drawing/2010/main">
-                  <a14:imgLayer r:embed="rId3">
-                    <a14:imgEffect>
-                      <a14:saturation sat="63000"/>
-                    </a14:imgEffect>
-                  </a14:imgLayer>
-                </a14:imgProps>
-              </a:ext>
-            </a:extLst>
           </a:blip>
           <a:srcRect/>
           <a:stretch>
@@ -11555,6 +11347,28 @@
         </p:nvSpPr>
         <p:spPr/>
         <p:txBody>
+          <a:bodyPr/>
+          <a:lstStyle/>
+          <a:p>
+            <a:r>
+              <a:rPr lang="en-US" dirty="0"/>
+              <a:t>Working with Files</a:t>
+            </a:r>
+          </a:p>
+        </p:txBody>
+      </p:sp>
+      <p:sp>
+        <p:nvSpPr>
+          <p:cNvPr id="3" name="Content Placeholder 2"/>
+          <p:cNvSpPr>
+            <a:spLocks noGrp="1"/>
+          </p:cNvSpPr>
+          <p:nvPr>
+            <p:ph idx="1"/>
+          </p:nvPr>
+        </p:nvSpPr>
+        <p:spPr/>
+        <p:txBody>
           <a:bodyPr>
             <a:normAutofit/>
           </a:bodyPr>
@@ -11562,78 +11376,75 @@
           <a:p>
             <a:r>
               <a:rPr lang="en-US" dirty="0"/>
-              <a:t>Review of Fundamentals</a:t>
-            </a:r>
-          </a:p>
-        </p:txBody>
-      </p:sp>
-      <p:sp>
-        <p:nvSpPr>
-          <p:cNvPr id="3" name="Content Placeholder 2"/>
-          <p:cNvSpPr>
-            <a:spLocks noGrp="1"/>
-          </p:cNvSpPr>
-          <p:nvPr>
-            <p:ph idx="1"/>
-          </p:nvPr>
-        </p:nvSpPr>
-        <p:spPr/>
-        <p:txBody>
-          <a:bodyPr>
-            <a:normAutofit/>
-          </a:bodyPr>
-          <a:lstStyle/>
-          <a:p>
-            <a:r>
-              <a:rPr lang="en-US" dirty="0"/>
-              <a:t>Variables and datatypes</a:t>
+              <a:t>Working with Files</a:t>
             </a:r>
           </a:p>
           <a:p>
             <a:pPr lvl="1"/>
             <a:r>
-              <a:rPr lang="en-US" dirty="0"/>
-              <a:t>Holds a specific value/set of values</a:t>
-            </a:r>
-          </a:p>
-          <a:p>
-            <a:pPr lvl="1"/>
-            <a:r>
-              <a:rPr lang="en-US" dirty="0"/>
-              <a:t>Int</a:t>
-            </a:r>
-          </a:p>
-          <a:p>
-            <a:pPr lvl="1"/>
-            <a:r>
-              <a:rPr lang="en-US" dirty="0"/>
-              <a:t>Float</a:t>
-            </a:r>
-          </a:p>
-          <a:p>
-            <a:pPr lvl="1"/>
-            <a:r>
-              <a:rPr lang="en-US" dirty="0"/>
-              <a:t>Str</a:t>
-            </a:r>
-          </a:p>
-          <a:p>
-            <a:pPr lvl="1"/>
-            <a:r>
-              <a:rPr lang="en-US" dirty="0"/>
-              <a:t>Datetime</a:t>
-            </a:r>
-          </a:p>
-          <a:p>
-            <a:pPr lvl="1"/>
-            <a:endParaRPr lang="en-US" dirty="0"/>
+              <a:rPr lang="en-US" dirty="0">
+                <a:solidFill>
+                  <a:srgbClr val="FFC000"/>
+                </a:solidFill>
+              </a:rPr>
+              <a:t>Commands Review</a:t>
+            </a:r>
+          </a:p>
+          <a:p>
+            <a:pPr lvl="2"/>
+            <a:r>
+              <a:rPr lang="en-US" dirty="0">
+                <a:latin typeface="Consolas" panose="020B0609020204030204" pitchFamily="49" charset="0"/>
+              </a:rPr>
+              <a:t>with open(</a:t>
+            </a:r>
+            <a:r>
+              <a:rPr lang="en-US" dirty="0" err="1">
+                <a:latin typeface="Consolas" panose="020B0609020204030204" pitchFamily="49" charset="0"/>
+              </a:rPr>
+              <a:t>filepath,mode</a:t>
+            </a:r>
+            <a:r>
+              <a:rPr lang="en-US" dirty="0">
+                <a:latin typeface="Consolas" panose="020B0609020204030204" pitchFamily="49" charset="0"/>
+              </a:rPr>
+              <a:t>) as file:</a:t>
+            </a:r>
+            <a:endParaRPr lang="en-US" sz="2000" dirty="0"/>
+          </a:p>
+          <a:p>
+            <a:pPr lvl="2"/>
+            <a:r>
+              <a:rPr lang="en-US" dirty="0" err="1">
+                <a:latin typeface="Consolas" panose="020B0609020204030204" pitchFamily="49" charset="0"/>
+              </a:rPr>
+              <a:t>fileHandle.closed</a:t>
+            </a:r>
+            <a:endParaRPr lang="en-US" dirty="0">
+              <a:latin typeface="Consolas" panose="020B0609020204030204" pitchFamily="49" charset="0"/>
+            </a:endParaRPr>
+          </a:p>
+          <a:p>
+            <a:pPr lvl="2"/>
+            <a:r>
+              <a:rPr lang="en-US" dirty="0" err="1">
+                <a:latin typeface="Consolas" panose="020B0609020204030204" pitchFamily="49" charset="0"/>
+              </a:rPr>
+              <a:t>fileHandle.close</a:t>
+            </a:r>
+            <a:r>
+              <a:rPr lang="en-US" dirty="0">
+                <a:latin typeface="Consolas" panose="020B0609020204030204" pitchFamily="49" charset="0"/>
+              </a:rPr>
+              <a:t>()</a:t>
+            </a:r>
           </a:p>
         </p:txBody>
       </p:sp>
     </p:spTree>
     <p:extLst>
       <p:ext uri="{BB962C8B-B14F-4D97-AF65-F5344CB8AC3E}">
-        <p14:creationId xmlns:p14="http://schemas.microsoft.com/office/powerpoint/2010/main" val="3345134260"/>
+        <p14:creationId xmlns:p14="http://schemas.microsoft.com/office/powerpoint/2010/main" val="4236073172"/>
       </p:ext>
     </p:extLst>
   </p:cSld>
@@ -11643,7 +11454,7 @@
 </p:sld>
 </file>
 
-<file path=ppt/slides/slide115.xml><?xml version="1.0" encoding="utf-8"?>
+<file path=ppt/slides/slide112.xml><?xml version="1.0" encoding="utf-8"?>
 <p:sld xmlns:a="http://schemas.openxmlformats.org/drawingml/2006/main" xmlns:r="http://schemas.openxmlformats.org/officeDocument/2006/relationships" xmlns:p="http://schemas.openxmlformats.org/presentationml/2006/main">
   <p:cSld>
     <p:bg>
@@ -11651,17 +11462,6 @@
         <a:blipFill dpi="0" rotWithShape="1">
           <a:blip r:embed="rId2">
             <a:lum/>
-            <a:extLst>
-              <a:ext uri="{BEBA8EAE-BF5A-486C-A8C5-ECC9F3942E4B}">
-                <a14:imgProps xmlns:a14="http://schemas.microsoft.com/office/drawing/2010/main">
-                  <a14:imgLayer r:embed="rId3">
-                    <a14:imgEffect>
-                      <a14:saturation sat="63000"/>
-                    </a14:imgEffect>
-                  </a14:imgLayer>
-                </a14:imgProps>
-              </a:ext>
-            </a:extLst>
           </a:blip>
           <a:srcRect/>
           <a:stretch>
@@ -11697,67 +11497,139 @@
         </p:nvSpPr>
         <p:spPr/>
         <p:txBody>
+          <a:bodyPr/>
+          <a:lstStyle/>
+          <a:p>
+            <a:r>
+              <a:rPr lang="en-US" dirty="0"/>
+              <a:t>Working with Files</a:t>
+            </a:r>
+          </a:p>
+        </p:txBody>
+      </p:sp>
+      <p:sp>
+        <p:nvSpPr>
+          <p:cNvPr id="3" name="Content Placeholder 2"/>
+          <p:cNvSpPr>
+            <a:spLocks noGrp="1"/>
+          </p:cNvSpPr>
+          <p:nvPr>
+            <p:ph idx="1"/>
+          </p:nvPr>
+        </p:nvSpPr>
+        <p:spPr/>
+        <p:txBody>
           <a:bodyPr>
-            <a:normAutofit/>
+            <a:normAutofit lnSpcReduction="10000"/>
           </a:bodyPr>
           <a:lstStyle/>
           <a:p>
             <a:r>
               <a:rPr lang="en-US" dirty="0"/>
-              <a:t>Review of Fundamentals</a:t>
-            </a:r>
-          </a:p>
-        </p:txBody>
-      </p:sp>
-      <p:sp>
-        <p:nvSpPr>
-          <p:cNvPr id="3" name="Content Placeholder 2"/>
-          <p:cNvSpPr>
-            <a:spLocks noGrp="1"/>
-          </p:cNvSpPr>
-          <p:nvPr>
-            <p:ph idx="1"/>
-          </p:nvPr>
-        </p:nvSpPr>
-        <p:spPr/>
-        <p:txBody>
-          <a:bodyPr>
-            <a:normAutofit/>
-          </a:bodyPr>
-          <a:lstStyle/>
-          <a:p>
-            <a:r>
-              <a:rPr lang="en-US" dirty="0"/>
-              <a:t>Collections</a:t>
+              <a:t>Working with Files</a:t>
             </a:r>
           </a:p>
           <a:p>
             <a:pPr lvl="1"/>
             <a:r>
-              <a:rPr lang="en-US" dirty="0"/>
-              <a:t>Tuples</a:t>
-            </a:r>
+              <a:rPr lang="en-US" dirty="0">
+                <a:solidFill>
+                  <a:srgbClr val="FFC000"/>
+                </a:solidFill>
+              </a:rPr>
+              <a:t>In-class exercises</a:t>
+            </a:r>
+          </a:p>
+          <a:p>
+            <a:pPr marL="914400" lvl="1" indent="-457200">
+              <a:buFont typeface="+mj-lt"/>
+              <a:buAutoNum type="arabicParenR"/>
+            </a:pPr>
+            <a:r>
+              <a:rPr lang="en-US" sz="2400" dirty="0"/>
+              <a:t>Write any string to any file on your system</a:t>
+            </a:r>
+          </a:p>
+          <a:p>
+            <a:pPr marL="914400" lvl="1" indent="-457200">
+              <a:buFont typeface="+mj-lt"/>
+              <a:buAutoNum type="arabicParenR"/>
+            </a:pPr>
+            <a:r>
+              <a:rPr lang="en-US" sz="2400" dirty="0"/>
+              <a:t>Add a string to the file created in the first exercise</a:t>
+            </a:r>
+          </a:p>
+          <a:p>
+            <a:pPr marL="914400" lvl="1" indent="-457200">
+              <a:buFont typeface="+mj-lt"/>
+              <a:buAutoNum type="arabicParenR"/>
+            </a:pPr>
+            <a:r>
+              <a:rPr lang="en-US" sz="2400" dirty="0"/>
+              <a:t>Read the strings from the file from (2), and write only the second string to a new file</a:t>
+            </a:r>
+          </a:p>
+          <a:p>
+            <a:pPr marL="914400" lvl="1" indent="-457200">
+              <a:buFont typeface="+mj-lt"/>
+              <a:buAutoNum type="arabicParenR"/>
+            </a:pPr>
+            <a:endParaRPr lang="en-US" sz="2400" dirty="0"/>
           </a:p>
           <a:p>
             <a:pPr lvl="1"/>
             <a:r>
-              <a:rPr lang="en-US" dirty="0"/>
-              <a:t>Lists</a:t>
-            </a:r>
-          </a:p>
-          <a:p>
-            <a:pPr lvl="1"/>
-            <a:r>
-              <a:rPr lang="en-US" dirty="0"/>
-              <a:t>Dictionaries</a:t>
-            </a:r>
+              <a:rPr lang="en-US" dirty="0">
+                <a:solidFill>
+                  <a:srgbClr val="FFC000"/>
+                </a:solidFill>
+              </a:rPr>
+              <a:t>Helpful Commands</a:t>
+            </a:r>
+          </a:p>
+          <a:p>
+            <a:pPr lvl="2"/>
+            <a:r>
+              <a:rPr lang="en-US" dirty="0">
+                <a:latin typeface="Consolas" panose="020B0609020204030204" pitchFamily="49" charset="0"/>
+              </a:rPr>
+              <a:t>with open(</a:t>
+            </a:r>
+            <a:r>
+              <a:rPr lang="en-US" dirty="0" err="1">
+                <a:latin typeface="Consolas" panose="020B0609020204030204" pitchFamily="49" charset="0"/>
+              </a:rPr>
+              <a:t>filepath,mode</a:t>
+            </a:r>
+            <a:r>
+              <a:rPr lang="en-US" dirty="0">
+                <a:latin typeface="Consolas" panose="020B0609020204030204" pitchFamily="49" charset="0"/>
+              </a:rPr>
+              <a:t>) as file:</a:t>
+            </a:r>
+            <a:endParaRPr lang="en-US" sz="2000" dirty="0"/>
+          </a:p>
+          <a:p>
+            <a:pPr lvl="2"/>
+            <a:r>
+              <a:rPr lang="en-US" dirty="0" err="1">
+                <a:latin typeface="Consolas" panose="020B0609020204030204" pitchFamily="49" charset="0"/>
+              </a:rPr>
+              <a:t>fileHandle.closed</a:t>
+            </a:r>
+            <a:endParaRPr lang="en-US" sz="2000" dirty="0"/>
+          </a:p>
+          <a:p>
+            <a:pPr lvl="2"/>
+            <a:endParaRPr lang="en-US" dirty="0"/>
           </a:p>
         </p:txBody>
       </p:sp>
     </p:spTree>
     <p:extLst>
       <p:ext uri="{BB962C8B-B14F-4D97-AF65-F5344CB8AC3E}">
-        <p14:creationId xmlns:p14="http://schemas.microsoft.com/office/powerpoint/2010/main" val="458228742"/>
+        <p14:creationId xmlns:p14="http://schemas.microsoft.com/office/powerpoint/2010/main" val="3333418055"/>
       </p:ext>
     </p:extLst>
   </p:cSld>
@@ -11767,7 +11639,7 @@
 </p:sld>
 </file>
 
-<file path=ppt/slides/slide116.xml><?xml version="1.0" encoding="utf-8"?>
+<file path=ppt/slides/slide113.xml><?xml version="1.0" encoding="utf-8"?>
 <p:sld xmlns:a="http://schemas.openxmlformats.org/drawingml/2006/main" xmlns:r="http://schemas.openxmlformats.org/officeDocument/2006/relationships" xmlns:p="http://schemas.openxmlformats.org/presentationml/2006/main">
   <p:cSld>
     <p:bg>
@@ -11775,17 +11647,6 @@
         <a:blipFill dpi="0" rotWithShape="1">
           <a:blip r:embed="rId2">
             <a:lum/>
-            <a:extLst>
-              <a:ext uri="{BEBA8EAE-BF5A-486C-A8C5-ECC9F3942E4B}">
-                <a14:imgProps xmlns:a14="http://schemas.microsoft.com/office/drawing/2010/main">
-                  <a14:imgLayer r:embed="rId3">
-                    <a14:imgEffect>
-                      <a14:saturation sat="63000"/>
-                    </a14:imgEffect>
-                  </a14:imgLayer>
-                </a14:imgProps>
-              </a:ext>
-            </a:extLst>
           </a:blip>
           <a:srcRect/>
           <a:stretch>
@@ -11828,7 +11689,7 @@
           <a:p>
             <a:r>
               <a:rPr lang="en-US" dirty="0"/>
-              <a:t>Review of Fundamentals</a:t>
+              <a:t>Working with Dates</a:t>
             </a:r>
           </a:p>
         </p:txBody>
@@ -11841,6 +11702,76 @@
           </p:cNvSpPr>
           <p:nvPr>
             <p:ph idx="1"/>
+          </p:nvPr>
+        </p:nvSpPr>
+        <p:spPr/>
+        <p:txBody>
+          <a:bodyPr/>
+          <a:lstStyle/>
+          <a:p>
+            <a:r>
+              <a:rPr lang="en-US" dirty="0"/>
+              <a:t>Working with Dates</a:t>
+            </a:r>
+          </a:p>
+          <a:p>
+            <a:pPr lvl="1"/>
+            <a:r>
+              <a:rPr lang="en-US" dirty="0"/>
+              <a:t>Problem: I can now get data from files, or am getting data from a database system, but all the dates are stored as strings.   This makes it hard to add or subtract days, months, and/or years.</a:t>
+            </a:r>
+          </a:p>
+          <a:p>
+            <a:pPr lvl="1"/>
+            <a:r>
+              <a:rPr lang="en-US" dirty="0">
+                <a:solidFill>
+                  <a:srgbClr val="FFC000"/>
+                </a:solidFill>
+              </a:rPr>
+              <a:t>How can I manipulate dates?</a:t>
+            </a:r>
+          </a:p>
+        </p:txBody>
+      </p:sp>
+    </p:spTree>
+    <p:extLst>
+      <p:ext uri="{BB962C8B-B14F-4D97-AF65-F5344CB8AC3E}">
+        <p14:creationId xmlns:p14="http://schemas.microsoft.com/office/powerpoint/2010/main" val="1060372174"/>
+      </p:ext>
+    </p:extLst>
+  </p:cSld>
+  <p:clrMapOvr>
+    <a:masterClrMapping/>
+  </p:clrMapOvr>
+</p:sld>
+</file>
+
+<file path=ppt/slides/slide114.xml><?xml version="1.0" encoding="utf-8"?>
+<p:sld xmlns:a="http://schemas.openxmlformats.org/drawingml/2006/main" xmlns:r="http://schemas.openxmlformats.org/officeDocument/2006/relationships" xmlns:p="http://schemas.openxmlformats.org/presentationml/2006/main">
+  <p:cSld>
+    <p:spTree>
+      <p:nvGrpSpPr>
+        <p:cNvPr id="1" name=""/>
+        <p:cNvGrpSpPr/>
+        <p:nvPr/>
+      </p:nvGrpSpPr>
+      <p:grpSpPr>
+        <a:xfrm>
+          <a:off x="0" y="0"/>
+          <a:ext cx="0" cy="0"/>
+          <a:chOff x="0" y="0"/>
+          <a:chExt cx="0" cy="0"/>
+        </a:xfrm>
+      </p:grpSpPr>
+      <p:sp>
+        <p:nvSpPr>
+          <p:cNvPr id="2" name="Title 1"/>
+          <p:cNvSpPr>
+            <a:spLocks noGrp="1"/>
+          </p:cNvSpPr>
+          <p:nvPr>
+            <p:ph type="title"/>
           </p:nvPr>
         </p:nvSpPr>
         <p:spPr/>
@@ -11852,28 +11783,101 @@
           <a:p>
             <a:r>
               <a:rPr lang="en-US" dirty="0"/>
-              <a:t>Conditional Statements/Branching Statements</a:t>
+              <a:t>Working with Dates</a:t>
+            </a:r>
+          </a:p>
+        </p:txBody>
+      </p:sp>
+      <p:sp>
+        <p:nvSpPr>
+          <p:cNvPr id="3" name="Content Placeholder 2"/>
+          <p:cNvSpPr>
+            <a:spLocks noGrp="1"/>
+          </p:cNvSpPr>
+          <p:nvPr>
+            <p:ph idx="1"/>
+          </p:nvPr>
+        </p:nvSpPr>
+        <p:spPr/>
+        <p:txBody>
+          <a:bodyPr>
+            <a:normAutofit/>
+          </a:bodyPr>
+          <a:lstStyle/>
+          <a:p>
+            <a:r>
+              <a:rPr lang="en-US" dirty="0"/>
+              <a:t>Datetime Library</a:t>
             </a:r>
           </a:p>
           <a:p>
             <a:pPr lvl="1"/>
             <a:r>
               <a:rPr lang="en-US" dirty="0"/>
-              <a:t>Executes a set of code based on criteria</a:t>
-            </a:r>
+              <a:t>Functions</a:t>
+            </a:r>
+          </a:p>
+          <a:p>
+            <a:pPr lvl="2"/>
+            <a:r>
+              <a:rPr lang="en-US" dirty="0" err="1"/>
+              <a:t>Datetime.datetime.Strptime</a:t>
+            </a:r>
+            <a:r>
+              <a:rPr lang="en-US" dirty="0"/>
+              <a:t>()</a:t>
+            </a:r>
+          </a:p>
+          <a:p>
+            <a:pPr lvl="2"/>
+            <a:r>
+              <a:rPr lang="en-US" dirty="0" err="1"/>
+              <a:t>Datetime.datetime.Strftime</a:t>
+            </a:r>
+            <a:r>
+              <a:rPr lang="en-US" dirty="0"/>
+              <a:t>()</a:t>
+            </a:r>
+          </a:p>
+          <a:p>
+            <a:pPr lvl="2"/>
+            <a:r>
+              <a:rPr lang="en-US" dirty="0" err="1"/>
+              <a:t>Datetime.timedelta</a:t>
+            </a:r>
+            <a:endParaRPr lang="en-US" dirty="0"/>
           </a:p>
           <a:p>
             <a:pPr lvl="1"/>
             <a:r>
               <a:rPr lang="en-US" dirty="0"/>
-              <a:t>Allows a computer to make decisions</a:t>
+              <a:t>How data is stored</a:t>
             </a:r>
           </a:p>
           <a:p>
             <a:pPr lvl="1"/>
             <a:r>
               <a:rPr lang="en-US" dirty="0"/>
-              <a:t>Can allow/prevent certain pathways of code</a:t>
+              <a:t>Getting specific parts of a datetime</a:t>
+            </a:r>
+          </a:p>
+          <a:p>
+            <a:pPr lvl="2"/>
+            <a:r>
+              <a:rPr lang="en-US" dirty="0"/>
+              <a:t>Hours, days, </a:t>
+            </a:r>
+            <a:r>
+              <a:rPr lang="en-US" dirty="0" err="1"/>
+              <a:t>etc</a:t>
+            </a:r>
+            <a:endParaRPr lang="en-US" dirty="0"/>
+          </a:p>
+          <a:p>
+            <a:pPr lvl="1"/>
+            <a:r>
+              <a:rPr lang="en-US" dirty="0"/>
+              <a:t>Limitations: can only use periods up to a month</a:t>
             </a:r>
           </a:p>
         </p:txBody>
@@ -11881,7 +11885,206 @@
     </p:spTree>
     <p:extLst>
       <p:ext uri="{BB962C8B-B14F-4D97-AF65-F5344CB8AC3E}">
-        <p14:creationId xmlns:p14="http://schemas.microsoft.com/office/powerpoint/2010/main" val="2214703419"/>
+        <p14:creationId xmlns:p14="http://schemas.microsoft.com/office/powerpoint/2010/main" val="156179251"/>
+      </p:ext>
+    </p:extLst>
+  </p:cSld>
+  <p:clrMapOvr>
+    <a:masterClrMapping/>
+  </p:clrMapOvr>
+</p:sld>
+</file>
+
+<file path=ppt/slides/slide115.xml><?xml version="1.0" encoding="utf-8"?>
+<p:sld xmlns:a="http://schemas.openxmlformats.org/drawingml/2006/main" xmlns:r="http://schemas.openxmlformats.org/officeDocument/2006/relationships" xmlns:p="http://schemas.openxmlformats.org/presentationml/2006/main">
+  <p:cSld>
+    <p:spTree>
+      <p:nvGrpSpPr>
+        <p:cNvPr id="1" name=""/>
+        <p:cNvGrpSpPr/>
+        <p:nvPr/>
+      </p:nvGrpSpPr>
+      <p:grpSpPr>
+        <a:xfrm>
+          <a:off x="0" y="0"/>
+          <a:ext cx="0" cy="0"/>
+          <a:chOff x="0" y="0"/>
+          <a:chExt cx="0" cy="0"/>
+        </a:xfrm>
+      </p:grpSpPr>
+      <p:sp>
+        <p:nvSpPr>
+          <p:cNvPr id="2" name="Title 1"/>
+          <p:cNvSpPr>
+            <a:spLocks noGrp="1"/>
+          </p:cNvSpPr>
+          <p:nvPr>
+            <p:ph type="title"/>
+          </p:nvPr>
+        </p:nvSpPr>
+        <p:spPr/>
+        <p:txBody>
+          <a:bodyPr>
+            <a:normAutofit/>
+          </a:bodyPr>
+          <a:lstStyle/>
+          <a:p>
+            <a:r>
+              <a:rPr lang="en-US" dirty="0"/>
+              <a:t>Working with Dates</a:t>
+            </a:r>
+          </a:p>
+        </p:txBody>
+      </p:sp>
+      <p:sp>
+        <p:nvSpPr>
+          <p:cNvPr id="3" name="Content Placeholder 2"/>
+          <p:cNvSpPr>
+            <a:spLocks noGrp="1"/>
+          </p:cNvSpPr>
+          <p:nvPr>
+            <p:ph idx="1"/>
+          </p:nvPr>
+        </p:nvSpPr>
+        <p:spPr/>
+        <p:txBody>
+          <a:bodyPr>
+            <a:normAutofit/>
+          </a:bodyPr>
+          <a:lstStyle/>
+          <a:p>
+            <a:r>
+              <a:rPr lang="en-US" dirty="0" err="1"/>
+              <a:t>DateUtil</a:t>
+            </a:r>
+            <a:r>
+              <a:rPr lang="en-US" dirty="0"/>
+              <a:t> Library</a:t>
+            </a:r>
+          </a:p>
+          <a:p>
+            <a:pPr lvl="1"/>
+            <a:r>
+              <a:rPr lang="en-US" dirty="0"/>
+              <a:t>Compatible with datetime library</a:t>
+            </a:r>
+          </a:p>
+          <a:p>
+            <a:pPr lvl="2"/>
+            <a:r>
+              <a:rPr lang="en-US"/>
+              <a:t>Same objects</a:t>
+            </a:r>
+          </a:p>
+          <a:p>
+            <a:pPr lvl="1"/>
+            <a:r>
+              <a:rPr lang="en-US" dirty="0" err="1"/>
+              <a:t>Dateutil.relativedelta.relativedelta</a:t>
+            </a:r>
+            <a:r>
+              <a:rPr lang="en-US" dirty="0"/>
+              <a:t>()</a:t>
+            </a:r>
+          </a:p>
+          <a:p>
+            <a:pPr lvl="2"/>
+            <a:r>
+              <a:rPr lang="en-US" dirty="0"/>
+              <a:t>Periods up to a year</a:t>
+            </a:r>
+          </a:p>
+        </p:txBody>
+      </p:sp>
+    </p:spTree>
+    <p:extLst>
+      <p:ext uri="{BB962C8B-B14F-4D97-AF65-F5344CB8AC3E}">
+        <p14:creationId xmlns:p14="http://schemas.microsoft.com/office/powerpoint/2010/main" val="1561744575"/>
+      </p:ext>
+    </p:extLst>
+  </p:cSld>
+  <p:clrMapOvr>
+    <a:masterClrMapping/>
+  </p:clrMapOvr>
+</p:sld>
+</file>
+
+<file path=ppt/slides/slide116.xml><?xml version="1.0" encoding="utf-8"?>
+<p:sld xmlns:a="http://schemas.openxmlformats.org/drawingml/2006/main" xmlns:r="http://schemas.openxmlformats.org/officeDocument/2006/relationships" xmlns:p="http://schemas.openxmlformats.org/presentationml/2006/main">
+  <p:cSld>
+    <p:spTree>
+      <p:nvGrpSpPr>
+        <p:cNvPr id="1" name=""/>
+        <p:cNvGrpSpPr/>
+        <p:nvPr/>
+      </p:nvGrpSpPr>
+      <p:grpSpPr>
+        <a:xfrm>
+          <a:off x="0" y="0"/>
+          <a:ext cx="0" cy="0"/>
+          <a:chOff x="0" y="0"/>
+          <a:chExt cx="0" cy="0"/>
+        </a:xfrm>
+      </p:grpSpPr>
+      <p:sp>
+        <p:nvSpPr>
+          <p:cNvPr id="2" name="Title 1"/>
+          <p:cNvSpPr>
+            <a:spLocks noGrp="1"/>
+          </p:cNvSpPr>
+          <p:nvPr>
+            <p:ph type="title"/>
+          </p:nvPr>
+        </p:nvSpPr>
+        <p:spPr/>
+        <p:txBody>
+          <a:bodyPr>
+            <a:normAutofit/>
+          </a:bodyPr>
+          <a:lstStyle/>
+          <a:p>
+            <a:r>
+              <a:rPr lang="en-US" dirty="0"/>
+              <a:t>Working with Dates</a:t>
+            </a:r>
+          </a:p>
+        </p:txBody>
+      </p:sp>
+      <p:sp>
+        <p:nvSpPr>
+          <p:cNvPr id="3" name="Content Placeholder 2"/>
+          <p:cNvSpPr>
+            <a:spLocks noGrp="1"/>
+          </p:cNvSpPr>
+          <p:nvPr>
+            <p:ph idx="1"/>
+          </p:nvPr>
+        </p:nvSpPr>
+        <p:spPr/>
+        <p:txBody>
+          <a:bodyPr>
+            <a:normAutofit/>
+          </a:bodyPr>
+          <a:lstStyle/>
+          <a:p>
+            <a:r>
+              <a:rPr lang="en-US" dirty="0"/>
+              <a:t>Datetime Library Side Notes</a:t>
+            </a:r>
+          </a:p>
+          <a:p>
+            <a:pPr lvl="1"/>
+            <a:r>
+              <a:rPr lang="en-US" dirty="0"/>
+              <a:t>See example script “Datetime Tutorial.py</a:t>
+            </a:r>
+          </a:p>
+        </p:txBody>
+      </p:sp>
+    </p:spTree>
+    <p:extLst>
+      <p:ext uri="{BB962C8B-B14F-4D97-AF65-F5344CB8AC3E}">
+        <p14:creationId xmlns:p14="http://schemas.microsoft.com/office/powerpoint/2010/main" val="2349402568"/>
       </p:ext>
     </p:extLst>
   </p:cSld>
@@ -11976,6 +12179,34 @@
           <a:p>
             <a:r>
               <a:rPr lang="en-US" dirty="0"/>
+              <a:t>Overview</a:t>
+            </a:r>
+          </a:p>
+          <a:p>
+            <a:pPr lvl="1"/>
+            <a:r>
+              <a:rPr lang="en-US" dirty="0"/>
+              <a:t>Variables and datatypes</a:t>
+            </a:r>
+          </a:p>
+          <a:p>
+            <a:pPr lvl="1"/>
+            <a:r>
+              <a:rPr lang="en-US" dirty="0"/>
+              <a:t>Collections</a:t>
+            </a:r>
+          </a:p>
+          <a:p>
+            <a:pPr lvl="1"/>
+            <a:r>
+              <a:rPr lang="en-US" dirty="0"/>
+              <a:t>Conditional Statements/Branching Statements</a:t>
+            </a:r>
+          </a:p>
+          <a:p>
+            <a:pPr lvl="1"/>
+            <a:r>
+              <a:rPr lang="en-US" dirty="0"/>
               <a:t>Loops</a:t>
             </a:r>
           </a:p>
@@ -11983,21 +12214,14 @@
             <a:pPr lvl="1"/>
             <a:r>
               <a:rPr lang="en-US" dirty="0"/>
-              <a:t>Allows iterations – running the same section of code repeatedly</a:t>
+              <a:t>Functions</a:t>
             </a:r>
           </a:p>
           <a:p>
             <a:pPr lvl="1"/>
             <a:r>
               <a:rPr lang="en-US" dirty="0"/>
-              <a:t>Can continue executing through a set of values</a:t>
-            </a:r>
-          </a:p>
-          <a:p>
-            <a:pPr lvl="1"/>
-            <a:r>
-              <a:rPr lang="en-US" dirty="0"/>
-              <a:t>Can continue executing based on a condition</a:t>
+              <a:t>Working with Files</a:t>
             </a:r>
           </a:p>
         </p:txBody>
@@ -12005,7 +12229,7 @@
     </p:spTree>
     <p:extLst>
       <p:ext uri="{BB962C8B-B14F-4D97-AF65-F5344CB8AC3E}">
-        <p14:creationId xmlns:p14="http://schemas.microsoft.com/office/powerpoint/2010/main" val="2059335015"/>
+        <p14:creationId xmlns:p14="http://schemas.microsoft.com/office/powerpoint/2010/main" val="1126409660"/>
       </p:ext>
     </p:extLst>
   </p:cSld>
@@ -12100,50 +12324,54 @@
           <a:p>
             <a:r>
               <a:rPr lang="en-US" dirty="0"/>
-              <a:t>Functions</a:t>
+              <a:t>Variables and datatypes</a:t>
             </a:r>
           </a:p>
           <a:p>
             <a:pPr lvl="1"/>
             <a:r>
               <a:rPr lang="en-US" dirty="0"/>
-              <a:t>Creates section of reusable code</a:t>
+              <a:t>Holds a specific value/set of values</a:t>
             </a:r>
           </a:p>
           <a:p>
             <a:pPr lvl="1"/>
             <a:r>
               <a:rPr lang="en-US" dirty="0"/>
-              <a:t>Can have inputs</a:t>
+              <a:t>Int</a:t>
             </a:r>
           </a:p>
           <a:p>
             <a:pPr lvl="1"/>
             <a:r>
               <a:rPr lang="en-US" dirty="0"/>
-              <a:t>Can have a return value</a:t>
+              <a:t>Float</a:t>
             </a:r>
           </a:p>
           <a:p>
             <a:pPr lvl="1"/>
             <a:r>
               <a:rPr lang="en-US" dirty="0"/>
-              <a:t>Allows cleaner code</a:t>
+              <a:t>Str</a:t>
             </a:r>
           </a:p>
           <a:p>
             <a:pPr lvl="1"/>
             <a:r>
               <a:rPr lang="en-US" dirty="0"/>
-              <a:t>Allows more maintainable code</a:t>
-            </a:r>
+              <a:t>Datetime</a:t>
+            </a:r>
+          </a:p>
+          <a:p>
+            <a:pPr lvl="1"/>
+            <a:endParaRPr lang="en-US" dirty="0"/>
           </a:p>
         </p:txBody>
       </p:sp>
     </p:spTree>
     <p:extLst>
       <p:ext uri="{BB962C8B-B14F-4D97-AF65-F5344CB8AC3E}">
-        <p14:creationId xmlns:p14="http://schemas.microsoft.com/office/powerpoint/2010/main" val="2853370233"/>
+        <p14:creationId xmlns:p14="http://schemas.microsoft.com/office/powerpoint/2010/main" val="3345134260"/>
       </p:ext>
     </p:extLst>
   </p:cSld>
@@ -12238,37 +12466,28 @@
           <a:p>
             <a:r>
               <a:rPr lang="en-US" dirty="0"/>
-              <a:t>Working with Files</a:t>
+              <a:t>Collections</a:t>
             </a:r>
           </a:p>
           <a:p>
             <a:pPr lvl="1"/>
             <a:r>
               <a:rPr lang="en-US" dirty="0"/>
-              <a:t>File types accessible</a:t>
+              <a:t>Tuples</a:t>
             </a:r>
           </a:p>
           <a:p>
             <a:pPr lvl="1"/>
             <a:r>
               <a:rPr lang="en-US" dirty="0"/>
-              <a:t>Using </a:t>
-            </a:r>
-            <a:r>
-              <a:rPr lang="en-US" dirty="0">
-                <a:latin typeface="Consolas" panose="020B0609020204030204" pitchFamily="49" charset="0"/>
-              </a:rPr>
-              <a:t>with</a:t>
-            </a:r>
-            <a:r>
-              <a:rPr lang="en-US" dirty="0"/>
-              <a:t> vs just </a:t>
-            </a:r>
-            <a:r>
-              <a:rPr lang="en-US" dirty="0">
-                <a:latin typeface="Consolas" panose="020B0609020204030204" pitchFamily="49" charset="0"/>
-              </a:rPr>
-              <a:t>open()</a:t>
+              <a:t>Lists</a:t>
+            </a:r>
+          </a:p>
+          <a:p>
+            <a:pPr lvl="1"/>
+            <a:r>
+              <a:rPr lang="en-US" dirty="0"/>
+              <a:t>Dictionaries</a:t>
             </a:r>
           </a:p>
         </p:txBody>
@@ -12276,7 +12495,7 @@
     </p:spTree>
     <p:extLst>
       <p:ext uri="{BB962C8B-B14F-4D97-AF65-F5344CB8AC3E}">
-        <p14:creationId xmlns:p14="http://schemas.microsoft.com/office/powerpoint/2010/main" val="1369074896"/>
+        <p14:creationId xmlns:p14="http://schemas.microsoft.com/office/powerpoint/2010/main" val="458228742"/>
       </p:ext>
     </p:extLst>
   </p:cSld>
@@ -12405,12 +12624,13 @@
       <p:bgPr>
         <a:blipFill dpi="0" rotWithShape="1">
           <a:blip r:embed="rId2">
+            <a:lum/>
             <a:extLst>
               <a:ext uri="{BEBA8EAE-BF5A-486C-A8C5-ECC9F3942E4B}">
                 <a14:imgProps xmlns:a14="http://schemas.microsoft.com/office/drawing/2010/main">
                   <a14:imgLayer r:embed="rId3">
                     <a14:imgEffect>
-                      <a14:brightnessContrast bright="-62000"/>
+                      <a14:saturation sat="63000"/>
                     </a14:imgEffect>
                   </a14:imgLayer>
                 </a14:imgProps>
@@ -12441,13 +12661,7 @@
       </p:grpSpPr>
       <p:sp>
         <p:nvSpPr>
-          <p:cNvPr id="2" name="Title 1">
-            <a:extLst>
-              <a:ext uri="{FF2B5EF4-FFF2-40B4-BE49-F238E27FC236}">
-                <a16:creationId xmlns:a16="http://schemas.microsoft.com/office/drawing/2014/main" id="{DC9FCF76-894F-4720-BE10-F9A60A388F7D}"/>
-              </a:ext>
-            </a:extLst>
-          </p:cNvPr>
+          <p:cNvPr id="2" name="Title 1"/>
           <p:cNvSpPr>
             <a:spLocks noGrp="1"/>
           </p:cNvSpPr>
@@ -12464,20 +12678,14 @@
           <a:p>
             <a:r>
               <a:rPr lang="en-US" dirty="0"/>
-              <a:t>In-Class Exercises</a:t>
-            </a:r>
-          </a:p>
-        </p:txBody>
-      </p:sp>
-      <p:sp>
-        <p:nvSpPr>
-          <p:cNvPr id="3" name="Content Placeholder 2">
-            <a:extLst>
-              <a:ext uri="{FF2B5EF4-FFF2-40B4-BE49-F238E27FC236}">
-                <a16:creationId xmlns:a16="http://schemas.microsoft.com/office/drawing/2014/main" id="{0C1F1D40-CDB0-4697-B6D3-CDD26AEC8870}"/>
-              </a:ext>
-            </a:extLst>
-          </p:cNvPr>
+              <a:t>Review of Fundamentals</a:t>
+            </a:r>
+          </a:p>
+        </p:txBody>
+      </p:sp>
+      <p:sp>
+        <p:nvSpPr>
+          <p:cNvPr id="3" name="Content Placeholder 2"/>
           <p:cNvSpPr>
             <a:spLocks noGrp="1"/>
           </p:cNvSpPr>
@@ -12485,31 +12693,45 @@
             <p:ph idx="1"/>
           </p:nvPr>
         </p:nvSpPr>
-        <p:spPr>
-          <a:xfrm>
-            <a:off x="457200" y="1600200"/>
-            <a:ext cx="8229600" cy="4525963"/>
-          </a:xfrm>
-        </p:spPr>
-        <p:txBody>
-          <a:bodyPr/>
-          <a:lstStyle/>
-          <a:p>
-            <a:r>
-              <a:rPr lang="en-US" dirty="0"/>
-              <a:t>Loop Exercises</a:t>
+        <p:spPr/>
+        <p:txBody>
+          <a:bodyPr>
+            <a:normAutofit/>
+          </a:bodyPr>
+          <a:lstStyle/>
+          <a:p>
+            <a:r>
+              <a:rPr lang="en-US" dirty="0"/>
+              <a:t>Conditional Statements/Branching Statements</a:t>
             </a:r>
           </a:p>
           <a:p>
             <a:pPr lvl="1"/>
-            <a:endParaRPr lang="en-US" dirty="0"/>
+            <a:r>
+              <a:rPr lang="en-US" dirty="0"/>
+              <a:t>Executes a set of code based on criteria</a:t>
+            </a:r>
+          </a:p>
+          <a:p>
+            <a:pPr lvl="1"/>
+            <a:r>
+              <a:rPr lang="en-US" dirty="0"/>
+              <a:t>Allows a computer to make decisions</a:t>
+            </a:r>
+          </a:p>
+          <a:p>
+            <a:pPr lvl="1"/>
+            <a:r>
+              <a:rPr lang="en-US" dirty="0"/>
+              <a:t>Can allow/prevent certain pathways of code</a:t>
+            </a:r>
           </a:p>
         </p:txBody>
       </p:sp>
     </p:spTree>
     <p:extLst>
       <p:ext uri="{BB962C8B-B14F-4D97-AF65-F5344CB8AC3E}">
-        <p14:creationId xmlns:p14="http://schemas.microsoft.com/office/powerpoint/2010/main" val="3766008556"/>
+        <p14:creationId xmlns:p14="http://schemas.microsoft.com/office/powerpoint/2010/main" val="2214703419"/>
       </p:ext>
     </p:extLst>
   </p:cSld>
@@ -12520,6 +12742,401 @@
 </file>
 
 <file path=ppt/slides/slide121.xml><?xml version="1.0" encoding="utf-8"?>
+<p:sld xmlns:a="http://schemas.openxmlformats.org/drawingml/2006/main" xmlns:r="http://schemas.openxmlformats.org/officeDocument/2006/relationships" xmlns:p="http://schemas.openxmlformats.org/presentationml/2006/main">
+  <p:cSld>
+    <p:bg>
+      <p:bgPr>
+        <a:blipFill dpi="0" rotWithShape="1">
+          <a:blip r:embed="rId2">
+            <a:lum/>
+            <a:extLst>
+              <a:ext uri="{BEBA8EAE-BF5A-486C-A8C5-ECC9F3942E4B}">
+                <a14:imgProps xmlns:a14="http://schemas.microsoft.com/office/drawing/2010/main">
+                  <a14:imgLayer r:embed="rId3">
+                    <a14:imgEffect>
+                      <a14:saturation sat="63000"/>
+                    </a14:imgEffect>
+                  </a14:imgLayer>
+                </a14:imgProps>
+              </a:ext>
+            </a:extLst>
+          </a:blip>
+          <a:srcRect/>
+          <a:stretch>
+            <a:fillRect l="-10000" r="-10000"/>
+          </a:stretch>
+        </a:blipFill>
+        <a:effectLst/>
+      </p:bgPr>
+    </p:bg>
+    <p:spTree>
+      <p:nvGrpSpPr>
+        <p:cNvPr id="1" name=""/>
+        <p:cNvGrpSpPr/>
+        <p:nvPr/>
+      </p:nvGrpSpPr>
+      <p:grpSpPr>
+        <a:xfrm>
+          <a:off x="0" y="0"/>
+          <a:ext cx="0" cy="0"/>
+          <a:chOff x="0" y="0"/>
+          <a:chExt cx="0" cy="0"/>
+        </a:xfrm>
+      </p:grpSpPr>
+      <p:sp>
+        <p:nvSpPr>
+          <p:cNvPr id="2" name="Title 1"/>
+          <p:cNvSpPr>
+            <a:spLocks noGrp="1"/>
+          </p:cNvSpPr>
+          <p:nvPr>
+            <p:ph type="title"/>
+          </p:nvPr>
+        </p:nvSpPr>
+        <p:spPr/>
+        <p:txBody>
+          <a:bodyPr>
+            <a:normAutofit/>
+          </a:bodyPr>
+          <a:lstStyle/>
+          <a:p>
+            <a:r>
+              <a:rPr lang="en-US" dirty="0"/>
+              <a:t>Review of Fundamentals</a:t>
+            </a:r>
+          </a:p>
+        </p:txBody>
+      </p:sp>
+      <p:sp>
+        <p:nvSpPr>
+          <p:cNvPr id="3" name="Content Placeholder 2"/>
+          <p:cNvSpPr>
+            <a:spLocks noGrp="1"/>
+          </p:cNvSpPr>
+          <p:nvPr>
+            <p:ph idx="1"/>
+          </p:nvPr>
+        </p:nvSpPr>
+        <p:spPr/>
+        <p:txBody>
+          <a:bodyPr>
+            <a:normAutofit/>
+          </a:bodyPr>
+          <a:lstStyle/>
+          <a:p>
+            <a:r>
+              <a:rPr lang="en-US" dirty="0"/>
+              <a:t>Loops</a:t>
+            </a:r>
+          </a:p>
+          <a:p>
+            <a:pPr lvl="1"/>
+            <a:r>
+              <a:rPr lang="en-US" dirty="0"/>
+              <a:t>Allows iterations – running the same section of code repeatedly</a:t>
+            </a:r>
+          </a:p>
+          <a:p>
+            <a:pPr lvl="1"/>
+            <a:r>
+              <a:rPr lang="en-US" dirty="0"/>
+              <a:t>Can continue executing through a set of values</a:t>
+            </a:r>
+          </a:p>
+          <a:p>
+            <a:pPr lvl="1"/>
+            <a:r>
+              <a:rPr lang="en-US" dirty="0"/>
+              <a:t>Can continue executing based on a condition</a:t>
+            </a:r>
+          </a:p>
+        </p:txBody>
+      </p:sp>
+    </p:spTree>
+    <p:extLst>
+      <p:ext uri="{BB962C8B-B14F-4D97-AF65-F5344CB8AC3E}">
+        <p14:creationId xmlns:p14="http://schemas.microsoft.com/office/powerpoint/2010/main" val="2059335015"/>
+      </p:ext>
+    </p:extLst>
+  </p:cSld>
+  <p:clrMapOvr>
+    <a:masterClrMapping/>
+  </p:clrMapOvr>
+</p:sld>
+</file>
+
+<file path=ppt/slides/slide122.xml><?xml version="1.0" encoding="utf-8"?>
+<p:sld xmlns:a="http://schemas.openxmlformats.org/drawingml/2006/main" xmlns:r="http://schemas.openxmlformats.org/officeDocument/2006/relationships" xmlns:p="http://schemas.openxmlformats.org/presentationml/2006/main">
+  <p:cSld>
+    <p:bg>
+      <p:bgPr>
+        <a:blipFill dpi="0" rotWithShape="1">
+          <a:blip r:embed="rId2">
+            <a:lum/>
+            <a:extLst>
+              <a:ext uri="{BEBA8EAE-BF5A-486C-A8C5-ECC9F3942E4B}">
+                <a14:imgProps xmlns:a14="http://schemas.microsoft.com/office/drawing/2010/main">
+                  <a14:imgLayer r:embed="rId3">
+                    <a14:imgEffect>
+                      <a14:saturation sat="63000"/>
+                    </a14:imgEffect>
+                  </a14:imgLayer>
+                </a14:imgProps>
+              </a:ext>
+            </a:extLst>
+          </a:blip>
+          <a:srcRect/>
+          <a:stretch>
+            <a:fillRect l="-10000" r="-10000"/>
+          </a:stretch>
+        </a:blipFill>
+        <a:effectLst/>
+      </p:bgPr>
+    </p:bg>
+    <p:spTree>
+      <p:nvGrpSpPr>
+        <p:cNvPr id="1" name=""/>
+        <p:cNvGrpSpPr/>
+        <p:nvPr/>
+      </p:nvGrpSpPr>
+      <p:grpSpPr>
+        <a:xfrm>
+          <a:off x="0" y="0"/>
+          <a:ext cx="0" cy="0"/>
+          <a:chOff x="0" y="0"/>
+          <a:chExt cx="0" cy="0"/>
+        </a:xfrm>
+      </p:grpSpPr>
+      <p:sp>
+        <p:nvSpPr>
+          <p:cNvPr id="2" name="Title 1"/>
+          <p:cNvSpPr>
+            <a:spLocks noGrp="1"/>
+          </p:cNvSpPr>
+          <p:nvPr>
+            <p:ph type="title"/>
+          </p:nvPr>
+        </p:nvSpPr>
+        <p:spPr/>
+        <p:txBody>
+          <a:bodyPr>
+            <a:normAutofit/>
+          </a:bodyPr>
+          <a:lstStyle/>
+          <a:p>
+            <a:r>
+              <a:rPr lang="en-US" dirty="0"/>
+              <a:t>Review of Fundamentals</a:t>
+            </a:r>
+          </a:p>
+        </p:txBody>
+      </p:sp>
+      <p:sp>
+        <p:nvSpPr>
+          <p:cNvPr id="3" name="Content Placeholder 2"/>
+          <p:cNvSpPr>
+            <a:spLocks noGrp="1"/>
+          </p:cNvSpPr>
+          <p:nvPr>
+            <p:ph idx="1"/>
+          </p:nvPr>
+        </p:nvSpPr>
+        <p:spPr/>
+        <p:txBody>
+          <a:bodyPr>
+            <a:normAutofit/>
+          </a:bodyPr>
+          <a:lstStyle/>
+          <a:p>
+            <a:r>
+              <a:rPr lang="en-US" dirty="0"/>
+              <a:t>Functions</a:t>
+            </a:r>
+          </a:p>
+          <a:p>
+            <a:pPr lvl="1"/>
+            <a:r>
+              <a:rPr lang="en-US" dirty="0"/>
+              <a:t>Creates section of reusable code</a:t>
+            </a:r>
+          </a:p>
+          <a:p>
+            <a:pPr lvl="1"/>
+            <a:r>
+              <a:rPr lang="en-US" dirty="0"/>
+              <a:t>Can have inputs</a:t>
+            </a:r>
+          </a:p>
+          <a:p>
+            <a:pPr lvl="1"/>
+            <a:r>
+              <a:rPr lang="en-US" dirty="0"/>
+              <a:t>Can have a return value</a:t>
+            </a:r>
+          </a:p>
+          <a:p>
+            <a:pPr lvl="1"/>
+            <a:r>
+              <a:rPr lang="en-US" dirty="0"/>
+              <a:t>Allows cleaner code</a:t>
+            </a:r>
+          </a:p>
+          <a:p>
+            <a:pPr lvl="1"/>
+            <a:r>
+              <a:rPr lang="en-US" dirty="0"/>
+              <a:t>Allows more maintainable code</a:t>
+            </a:r>
+          </a:p>
+        </p:txBody>
+      </p:sp>
+    </p:spTree>
+    <p:extLst>
+      <p:ext uri="{BB962C8B-B14F-4D97-AF65-F5344CB8AC3E}">
+        <p14:creationId xmlns:p14="http://schemas.microsoft.com/office/powerpoint/2010/main" val="2853370233"/>
+      </p:ext>
+    </p:extLst>
+  </p:cSld>
+  <p:clrMapOvr>
+    <a:masterClrMapping/>
+  </p:clrMapOvr>
+</p:sld>
+</file>
+
+<file path=ppt/slides/slide123.xml><?xml version="1.0" encoding="utf-8"?>
+<p:sld xmlns:a="http://schemas.openxmlformats.org/drawingml/2006/main" xmlns:r="http://schemas.openxmlformats.org/officeDocument/2006/relationships" xmlns:p="http://schemas.openxmlformats.org/presentationml/2006/main">
+  <p:cSld>
+    <p:bg>
+      <p:bgPr>
+        <a:blipFill dpi="0" rotWithShape="1">
+          <a:blip r:embed="rId2">
+            <a:lum/>
+            <a:extLst>
+              <a:ext uri="{BEBA8EAE-BF5A-486C-A8C5-ECC9F3942E4B}">
+                <a14:imgProps xmlns:a14="http://schemas.microsoft.com/office/drawing/2010/main">
+                  <a14:imgLayer r:embed="rId3">
+                    <a14:imgEffect>
+                      <a14:saturation sat="63000"/>
+                    </a14:imgEffect>
+                  </a14:imgLayer>
+                </a14:imgProps>
+              </a:ext>
+            </a:extLst>
+          </a:blip>
+          <a:srcRect/>
+          <a:stretch>
+            <a:fillRect l="-10000" r="-10000"/>
+          </a:stretch>
+        </a:blipFill>
+        <a:effectLst/>
+      </p:bgPr>
+    </p:bg>
+    <p:spTree>
+      <p:nvGrpSpPr>
+        <p:cNvPr id="1" name=""/>
+        <p:cNvGrpSpPr/>
+        <p:nvPr/>
+      </p:nvGrpSpPr>
+      <p:grpSpPr>
+        <a:xfrm>
+          <a:off x="0" y="0"/>
+          <a:ext cx="0" cy="0"/>
+          <a:chOff x="0" y="0"/>
+          <a:chExt cx="0" cy="0"/>
+        </a:xfrm>
+      </p:grpSpPr>
+      <p:sp>
+        <p:nvSpPr>
+          <p:cNvPr id="2" name="Title 1"/>
+          <p:cNvSpPr>
+            <a:spLocks noGrp="1"/>
+          </p:cNvSpPr>
+          <p:nvPr>
+            <p:ph type="title"/>
+          </p:nvPr>
+        </p:nvSpPr>
+        <p:spPr/>
+        <p:txBody>
+          <a:bodyPr>
+            <a:normAutofit/>
+          </a:bodyPr>
+          <a:lstStyle/>
+          <a:p>
+            <a:r>
+              <a:rPr lang="en-US" dirty="0"/>
+              <a:t>Review of Fundamentals</a:t>
+            </a:r>
+          </a:p>
+        </p:txBody>
+      </p:sp>
+      <p:sp>
+        <p:nvSpPr>
+          <p:cNvPr id="3" name="Content Placeholder 2"/>
+          <p:cNvSpPr>
+            <a:spLocks noGrp="1"/>
+          </p:cNvSpPr>
+          <p:nvPr>
+            <p:ph idx="1"/>
+          </p:nvPr>
+        </p:nvSpPr>
+        <p:spPr/>
+        <p:txBody>
+          <a:bodyPr>
+            <a:normAutofit/>
+          </a:bodyPr>
+          <a:lstStyle/>
+          <a:p>
+            <a:r>
+              <a:rPr lang="en-US" dirty="0"/>
+              <a:t>Working with Files</a:t>
+            </a:r>
+          </a:p>
+          <a:p>
+            <a:pPr lvl="1"/>
+            <a:r>
+              <a:rPr lang="en-US" dirty="0"/>
+              <a:t>File types accessible</a:t>
+            </a:r>
+          </a:p>
+          <a:p>
+            <a:pPr lvl="1"/>
+            <a:r>
+              <a:rPr lang="en-US" dirty="0"/>
+              <a:t>Using </a:t>
+            </a:r>
+            <a:r>
+              <a:rPr lang="en-US" dirty="0">
+                <a:latin typeface="Consolas" panose="020B0609020204030204" pitchFamily="49" charset="0"/>
+              </a:rPr>
+              <a:t>with</a:t>
+            </a:r>
+            <a:r>
+              <a:rPr lang="en-US" dirty="0"/>
+              <a:t> vs just </a:t>
+            </a:r>
+            <a:r>
+              <a:rPr lang="en-US" dirty="0">
+                <a:latin typeface="Consolas" panose="020B0609020204030204" pitchFamily="49" charset="0"/>
+              </a:rPr>
+              <a:t>open()</a:t>
+            </a:r>
+          </a:p>
+        </p:txBody>
+      </p:sp>
+    </p:spTree>
+    <p:extLst>
+      <p:ext uri="{BB962C8B-B14F-4D97-AF65-F5344CB8AC3E}">
+        <p14:creationId xmlns:p14="http://schemas.microsoft.com/office/powerpoint/2010/main" val="1369074896"/>
+      </p:ext>
+    </p:extLst>
+  </p:cSld>
+  <p:clrMapOvr>
+    <a:masterClrMapping/>
+  </p:clrMapOvr>
+</p:sld>
+</file>
+
+<file path=ppt/slides/slide124.xml><?xml version="1.0" encoding="utf-8"?>
 <p:sld xmlns:a="http://schemas.openxmlformats.org/drawingml/2006/main" xmlns:r="http://schemas.openxmlformats.org/officeDocument/2006/relationships" xmlns:p="http://schemas.openxmlformats.org/presentationml/2006/main">
   <p:cSld>
     <p:bg>
@@ -12609,7 +13226,7 @@
         <p:spPr>
           <a:xfrm>
             <a:off x="457200" y="1600200"/>
-            <a:ext cx="5486400" cy="4525963"/>
+            <a:ext cx="8229600" cy="4525963"/>
           </a:xfrm>
         </p:spPr>
         <p:txBody>
@@ -12618,15 +13235,19 @@
           <a:p>
             <a:r>
               <a:rPr lang="en-US" dirty="0"/>
-              <a:t>Function Exercises</a:t>
-            </a:r>
+              <a:t>Loop Exercises</a:t>
+            </a:r>
+          </a:p>
+          <a:p>
+            <a:pPr lvl="1"/>
+            <a:endParaRPr lang="en-US" dirty="0"/>
           </a:p>
         </p:txBody>
       </p:sp>
     </p:spTree>
     <p:extLst>
       <p:ext uri="{BB962C8B-B14F-4D97-AF65-F5344CB8AC3E}">
-        <p14:creationId xmlns:p14="http://schemas.microsoft.com/office/powerpoint/2010/main" val="2592873073"/>
+        <p14:creationId xmlns:p14="http://schemas.microsoft.com/office/powerpoint/2010/main" val="3766008556"/>
       </p:ext>
     </p:extLst>
   </p:cSld>
@@ -12636,7 +13257,7 @@
 </p:sld>
 </file>
 
-<file path=ppt/slides/slide122.xml><?xml version="1.0" encoding="utf-8"?>
+<file path=ppt/slides/slide125.xml><?xml version="1.0" encoding="utf-8"?>
 <p:sld xmlns:a="http://schemas.openxmlformats.org/drawingml/2006/main" xmlns:r="http://schemas.openxmlformats.org/officeDocument/2006/relationships" xmlns:p="http://schemas.openxmlformats.org/presentationml/2006/main">
   <p:cSld>
     <p:bg>
@@ -12735,7 +13356,7 @@
           <a:p>
             <a:r>
               <a:rPr lang="en-US" dirty="0"/>
-              <a:t>File Manipulation Exercises</a:t>
+              <a:t>Function Exercises</a:t>
             </a:r>
           </a:p>
         </p:txBody>
@@ -12743,7 +13364,7 @@
     </p:spTree>
     <p:extLst>
       <p:ext uri="{BB962C8B-B14F-4D97-AF65-F5344CB8AC3E}">
-        <p14:creationId xmlns:p14="http://schemas.microsoft.com/office/powerpoint/2010/main" val="877741861"/>
+        <p14:creationId xmlns:p14="http://schemas.microsoft.com/office/powerpoint/2010/main" val="2592873073"/>
       </p:ext>
     </p:extLst>
   </p:cSld>
@@ -12753,7 +13374,7 @@
 </p:sld>
 </file>
 
-<file path=ppt/slides/slide123.xml><?xml version="1.0" encoding="utf-8"?>
+<file path=ppt/slides/slide126.xml><?xml version="1.0" encoding="utf-8"?>
 <p:sld xmlns:a="http://schemas.openxmlformats.org/drawingml/2006/main" xmlns:r="http://schemas.openxmlformats.org/officeDocument/2006/relationships" xmlns:p="http://schemas.openxmlformats.org/presentationml/2006/main">
   <p:cSld>
     <p:bg>
@@ -12851,6 +13472,123 @@
           <a:lstStyle/>
           <a:p>
             <a:r>
+              <a:rPr lang="en-US" dirty="0"/>
+              <a:t>File Manipulation Exercises</a:t>
+            </a:r>
+          </a:p>
+        </p:txBody>
+      </p:sp>
+    </p:spTree>
+    <p:extLst>
+      <p:ext uri="{BB962C8B-B14F-4D97-AF65-F5344CB8AC3E}">
+        <p14:creationId xmlns:p14="http://schemas.microsoft.com/office/powerpoint/2010/main" val="877741861"/>
+      </p:ext>
+    </p:extLst>
+  </p:cSld>
+  <p:clrMapOvr>
+    <a:masterClrMapping/>
+  </p:clrMapOvr>
+</p:sld>
+</file>
+
+<file path=ppt/slides/slide127.xml><?xml version="1.0" encoding="utf-8"?>
+<p:sld xmlns:a="http://schemas.openxmlformats.org/drawingml/2006/main" xmlns:r="http://schemas.openxmlformats.org/officeDocument/2006/relationships" xmlns:p="http://schemas.openxmlformats.org/presentationml/2006/main">
+  <p:cSld>
+    <p:bg>
+      <p:bgPr>
+        <a:blipFill dpi="0" rotWithShape="1">
+          <a:blip r:embed="rId2">
+            <a:extLst>
+              <a:ext uri="{BEBA8EAE-BF5A-486C-A8C5-ECC9F3942E4B}">
+                <a14:imgProps xmlns:a14="http://schemas.microsoft.com/office/drawing/2010/main">
+                  <a14:imgLayer r:embed="rId3">
+                    <a14:imgEffect>
+                      <a14:brightnessContrast bright="-62000"/>
+                    </a14:imgEffect>
+                  </a14:imgLayer>
+                </a14:imgProps>
+              </a:ext>
+            </a:extLst>
+          </a:blip>
+          <a:srcRect/>
+          <a:stretch>
+            <a:fillRect l="-10000" r="-10000"/>
+          </a:stretch>
+        </a:blipFill>
+        <a:effectLst/>
+      </p:bgPr>
+    </p:bg>
+    <p:spTree>
+      <p:nvGrpSpPr>
+        <p:cNvPr id="1" name=""/>
+        <p:cNvGrpSpPr/>
+        <p:nvPr/>
+      </p:nvGrpSpPr>
+      <p:grpSpPr>
+        <a:xfrm>
+          <a:off x="0" y="0"/>
+          <a:ext cx="0" cy="0"/>
+          <a:chOff x="0" y="0"/>
+          <a:chExt cx="0" cy="0"/>
+        </a:xfrm>
+      </p:grpSpPr>
+      <p:sp>
+        <p:nvSpPr>
+          <p:cNvPr id="2" name="Title 1">
+            <a:extLst>
+              <a:ext uri="{FF2B5EF4-FFF2-40B4-BE49-F238E27FC236}">
+                <a16:creationId xmlns:a16="http://schemas.microsoft.com/office/drawing/2014/main" id="{DC9FCF76-894F-4720-BE10-F9A60A388F7D}"/>
+              </a:ext>
+            </a:extLst>
+          </p:cNvPr>
+          <p:cNvSpPr>
+            <a:spLocks noGrp="1"/>
+          </p:cNvSpPr>
+          <p:nvPr>
+            <p:ph type="title"/>
+          </p:nvPr>
+        </p:nvSpPr>
+        <p:spPr/>
+        <p:txBody>
+          <a:bodyPr>
+            <a:normAutofit/>
+          </a:bodyPr>
+          <a:lstStyle/>
+          <a:p>
+            <a:r>
+              <a:rPr lang="en-US" dirty="0"/>
+              <a:t>In-Class Exercises</a:t>
+            </a:r>
+          </a:p>
+        </p:txBody>
+      </p:sp>
+      <p:sp>
+        <p:nvSpPr>
+          <p:cNvPr id="3" name="Content Placeholder 2">
+            <a:extLst>
+              <a:ext uri="{FF2B5EF4-FFF2-40B4-BE49-F238E27FC236}">
+                <a16:creationId xmlns:a16="http://schemas.microsoft.com/office/drawing/2014/main" id="{0C1F1D40-CDB0-4697-B6D3-CDD26AEC8870}"/>
+              </a:ext>
+            </a:extLst>
+          </p:cNvPr>
+          <p:cNvSpPr>
+            <a:spLocks noGrp="1"/>
+          </p:cNvSpPr>
+          <p:nvPr>
+            <p:ph idx="1"/>
+          </p:nvPr>
+        </p:nvSpPr>
+        <p:spPr>
+          <a:xfrm>
+            <a:off x="457200" y="1600200"/>
+            <a:ext cx="5486400" cy="4525963"/>
+          </a:xfrm>
+        </p:spPr>
+        <p:txBody>
+          <a:bodyPr/>
+          <a:lstStyle/>
+          <a:p>
+            <a:r>
               <a:rPr lang="en-US"/>
               <a:t>Conditional Exercise</a:t>
             </a:r>
@@ -12874,7 +13612,7 @@
 </p:sld>
 </file>
 
-<file path=ppt/slides/slide124.xml><?xml version="1.0" encoding="utf-8"?>
+<file path=ppt/slides/slide128.xml><?xml version="1.0" encoding="utf-8"?>
 <p:sld xmlns:a="http://schemas.openxmlformats.org/drawingml/2006/main" xmlns:r="http://schemas.openxmlformats.org/officeDocument/2006/relationships" xmlns:p="http://schemas.openxmlformats.org/presentationml/2006/main">
   <p:cSld>
     <p:bg>
@@ -12979,7 +13717,7 @@
 </p:sld>
 </file>
 
-<file path=ppt/slides/slide125.xml><?xml version="1.0" encoding="utf-8"?>
+<file path=ppt/slides/slide129.xml><?xml version="1.0" encoding="utf-8"?>
 <p:sld xmlns:a="http://schemas.openxmlformats.org/drawingml/2006/main" xmlns:r="http://schemas.openxmlformats.org/officeDocument/2006/relationships" xmlns:p="http://schemas.openxmlformats.org/presentationml/2006/main">
   <p:cSld>
     <p:bg>

</xml_diff>